<commit_message>
looking more into donations_deductible
</commit_message>
<xml_diff>
--- a/tax-exempt-status/501ctype-groups.pptx
+++ b/tax-exempt-status/501ctype-groups.pptx
@@ -5,7 +5,7 @@
     <p:sldMasterId id="2147483648" r:id="rId1"/>
   </p:sldMasterIdLst>
   <p:notesMasterIdLst>
-    <p:notesMasterId r:id="rId17"/>
+    <p:notesMasterId r:id="rId16"/>
   </p:notesMasterIdLst>
   <p:sldIdLst>
     <p:sldId id="259" r:id="rId2"/>
@@ -18,11 +18,10 @@
     <p:sldId id="264" r:id="rId9"/>
     <p:sldId id="265" r:id="rId10"/>
     <p:sldId id="266" r:id="rId11"/>
-    <p:sldId id="267" r:id="rId12"/>
-    <p:sldId id="268" r:id="rId13"/>
-    <p:sldId id="269" r:id="rId14"/>
-    <p:sldId id="270" r:id="rId15"/>
-    <p:sldId id="271" r:id="rId16"/>
+    <p:sldId id="268" r:id="rId12"/>
+    <p:sldId id="269" r:id="rId13"/>
+    <p:sldId id="270" r:id="rId14"/>
+    <p:sldId id="271" r:id="rId15"/>
   </p:sldIdLst>
   <p:sldSz cx="12192000" cy="6858000"/>
   <p:notesSz cx="6858000" cy="9144000"/>
@@ -285,58 +284,6 @@
 </p188:cmLst>
 </file>
 
-<file path=ppt/comments/modernComment_10A_7686D107.xml><?xml version="1.0" encoding="utf-8"?>
-<p188:cmLst xmlns:a="http://schemas.openxmlformats.org/drawingml/2006/main" xmlns:r="http://schemas.openxmlformats.org/officeDocument/2006/relationships" xmlns:p188="http://schemas.microsoft.com/office/powerpoint/2018/8/main">
-  <p188:cm id="{CE0B9068-2357-3A4C-B974-10D4DF3C2AFA}" authorId="{96DA6438-3C69-68B9-76B6-8774FCC9BCCE}" created="2024-03-31T19:08:22.428">
-    <ac:txMkLst xmlns:ac="http://schemas.microsoft.com/office/drawing/2013/main/command">
-      <pc:docMk xmlns:pc="http://schemas.microsoft.com/office/powerpoint/2013/main/command"/>
-      <pc:sldMk xmlns:pc="http://schemas.microsoft.com/office/powerpoint/2013/main/command" cId="1988546823" sldId="266"/>
-      <ac:spMk id="35" creationId="{61BDC008-7BF7-024F-06EF-9E3F58E5D51B}"/>
-      <ac:txMk cp="0" len="11">
-        <ac:context len="12" hash="2453979366"/>
-      </ac:txMk>
-    </ac:txMkLst>
-    <p188:pos x="1454317" y="517495"/>
-    <p188:txBody>
-      <a:bodyPr/>
-      <a:lstStyle/>
-      <a:p>
-        <a:r>
-          <a:rPr lang="en-US"/>
-          <a:t>Looks like its 501c19 that’s wrong.</a:t>
-        </a:r>
-      </a:p>
-    </p188:txBody>
-  </p188:cm>
-</p188:cmLst>
-</file>
-
-<file path=ppt/comments/modernComment_10B_AC3C9184.xml><?xml version="1.0" encoding="utf-8"?>
-<p188:cmLst xmlns:a="http://schemas.openxmlformats.org/drawingml/2006/main" xmlns:r="http://schemas.openxmlformats.org/officeDocument/2006/relationships" xmlns:p188="http://schemas.microsoft.com/office/powerpoint/2018/8/main">
-  <p188:cm id="{020AA34A-6041-D641-B20C-E35E3554CBE6}" authorId="{96DA6438-3C69-68B9-76B6-8774FCC9BCCE}" created="2024-03-31T19:45:43.544">
-    <ac:txMkLst xmlns:ac="http://schemas.microsoft.com/office/drawing/2013/main/command">
-      <pc:docMk xmlns:pc="http://schemas.microsoft.com/office/powerpoint/2013/main/command"/>
-      <pc:sldMk xmlns:pc="http://schemas.microsoft.com/office/powerpoint/2013/main/command" cId="2889650564" sldId="267"/>
-      <ac:spMk id="35" creationId="{61BDC008-7BF7-024F-06EF-9E3F58E5D51B}"/>
-      <ac:txMk cp="0" len="11">
-        <ac:context len="12" hash="2453979366"/>
-      </ac:txMk>
-    </ac:txMkLst>
-    <p188:pos x="1454317" y="517495"/>
-    <p188:txBody>
-      <a:bodyPr/>
-      <a:lstStyle/>
-      <a:p>
-        <a:r>
-          <a:rPr lang="en-US"/>
-          <a:t>These mostly seem to be 501c4’s. But 501c5’s cannot receive deductible donations, so I think this is some kind of misclassification on the part of the IRS, or its something we are missing about 501c4’s</a:t>
-        </a:r>
-      </a:p>
-    </p188:txBody>
-  </p188:cm>
-</p188:cmLst>
-</file>
-
 <file path=ppt/comments/modernComment_10C_2862CB06.xml><?xml version="1.0" encoding="utf-8"?>
 <p188:cmLst xmlns:a="http://schemas.openxmlformats.org/drawingml/2006/main" xmlns:r="http://schemas.openxmlformats.org/officeDocument/2006/relationships" xmlns:p188="http://schemas.microsoft.com/office/powerpoint/2018/8/main">
   <p188:cm id="{C76ED1C0-6B1D-7945-AEF0-0F7AAE411D50}" authorId="{96DA6438-3C69-68B9-76B6-8774FCC9BCCE}" created="2024-03-31T19:21:05.893">
@@ -483,7 +430,7 @@
           <a:p>
             <a:fld id="{870AC77A-B789-CF40-85B0-C3661FA77BAA}" type="datetimeFigureOut">
               <a:rPr lang="en-US" smtClean="0"/>
-              <a:t>3/31/24</a:t>
+              <a:t>4/1/24</a:t>
             </a:fld>
             <a:endParaRPr lang="en-US"/>
           </a:p>
@@ -981,7 +928,7 @@
           <a:p>
             <a:fld id="{7505E6FD-3938-D442-9104-578E174A1637}" type="datetimeFigureOut">
               <a:rPr lang="en-US" smtClean="0"/>
-              <a:t>3/31/24</a:t>
+              <a:t>4/1/24</a:t>
             </a:fld>
             <a:endParaRPr lang="en-US"/>
           </a:p>
@@ -1179,7 +1126,7 @@
           <a:p>
             <a:fld id="{7505E6FD-3938-D442-9104-578E174A1637}" type="datetimeFigureOut">
               <a:rPr lang="en-US" smtClean="0"/>
-              <a:t>3/31/24</a:t>
+              <a:t>4/1/24</a:t>
             </a:fld>
             <a:endParaRPr lang="en-US"/>
           </a:p>
@@ -1387,7 +1334,7 @@
           <a:p>
             <a:fld id="{7505E6FD-3938-D442-9104-578E174A1637}" type="datetimeFigureOut">
               <a:rPr lang="en-US" smtClean="0"/>
-              <a:t>3/31/24</a:t>
+              <a:t>4/1/24</a:t>
             </a:fld>
             <a:endParaRPr lang="en-US"/>
           </a:p>
@@ -1585,7 +1532,7 @@
           <a:p>
             <a:fld id="{7505E6FD-3938-D442-9104-578E174A1637}" type="datetimeFigureOut">
               <a:rPr lang="en-US" smtClean="0"/>
-              <a:t>3/31/24</a:t>
+              <a:t>4/1/24</a:t>
             </a:fld>
             <a:endParaRPr lang="en-US"/>
           </a:p>
@@ -1860,7 +1807,7 @@
           <a:p>
             <a:fld id="{7505E6FD-3938-D442-9104-578E174A1637}" type="datetimeFigureOut">
               <a:rPr lang="en-US" smtClean="0"/>
-              <a:t>3/31/24</a:t>
+              <a:t>4/1/24</a:t>
             </a:fld>
             <a:endParaRPr lang="en-US"/>
           </a:p>
@@ -2125,7 +2072,7 @@
           <a:p>
             <a:fld id="{7505E6FD-3938-D442-9104-578E174A1637}" type="datetimeFigureOut">
               <a:rPr lang="en-US" smtClean="0"/>
-              <a:t>3/31/24</a:t>
+              <a:t>4/1/24</a:t>
             </a:fld>
             <a:endParaRPr lang="en-US"/>
           </a:p>
@@ -2537,7 +2484,7 @@
           <a:p>
             <a:fld id="{7505E6FD-3938-D442-9104-578E174A1637}" type="datetimeFigureOut">
               <a:rPr lang="en-US" smtClean="0"/>
-              <a:t>3/31/24</a:t>
+              <a:t>4/1/24</a:t>
             </a:fld>
             <a:endParaRPr lang="en-US"/>
           </a:p>
@@ -2678,7 +2625,7 @@
           <a:p>
             <a:fld id="{7505E6FD-3938-D442-9104-578E174A1637}" type="datetimeFigureOut">
               <a:rPr lang="en-US" smtClean="0"/>
-              <a:t>3/31/24</a:t>
+              <a:t>4/1/24</a:t>
             </a:fld>
             <a:endParaRPr lang="en-US"/>
           </a:p>
@@ -2791,7 +2738,7 @@
           <a:p>
             <a:fld id="{7505E6FD-3938-D442-9104-578E174A1637}" type="datetimeFigureOut">
               <a:rPr lang="en-US" smtClean="0"/>
-              <a:t>3/31/24</a:t>
+              <a:t>4/1/24</a:t>
             </a:fld>
             <a:endParaRPr lang="en-US"/>
           </a:p>
@@ -3102,7 +3049,7 @@
           <a:p>
             <a:fld id="{7505E6FD-3938-D442-9104-578E174A1637}" type="datetimeFigureOut">
               <a:rPr lang="en-US" smtClean="0"/>
-              <a:t>3/31/24</a:t>
+              <a:t>4/1/24</a:t>
             </a:fld>
             <a:endParaRPr lang="en-US"/>
           </a:p>
@@ -3390,7 +3337,7 @@
           <a:p>
             <a:fld id="{7505E6FD-3938-D442-9104-578E174A1637}" type="datetimeFigureOut">
               <a:rPr lang="en-US" smtClean="0"/>
-              <a:t>3/31/24</a:t>
+              <a:t>4/1/24</a:t>
             </a:fld>
             <a:endParaRPr lang="en-US"/>
           </a:p>
@@ -3631,7 +3578,7 @@
           <a:p>
             <a:fld id="{7505E6FD-3938-D442-9104-578E174A1637}" type="datetimeFigureOut">
               <a:rPr lang="en-US" smtClean="0"/>
-              <a:t>3/31/24</a:t>
+              <a:t>4/1/24</a:t>
             </a:fld>
             <a:endParaRPr lang="en-US"/>
           </a:p>
@@ -7432,7 +7379,7 @@
           <p:nvPr/>
         </p:nvPicPr>
         <p:blipFill>
-          <a:blip r:embed="rId3"/>
+          <a:blip r:embed="rId2"/>
           <a:stretch>
             <a:fillRect/>
           </a:stretch>
@@ -8204,10 +8151,10 @@
       </p:sp>
       <p:pic>
         <p:nvPicPr>
-          <p:cNvPr id="39" name="Picture 38" descr="A number on a white background&#10;&#10;Description automatically generated">
-            <a:extLst>
-              <a:ext uri="{FF2B5EF4-FFF2-40B4-BE49-F238E27FC236}">
-                <a16:creationId xmlns:a16="http://schemas.microsoft.com/office/drawing/2014/main" id="{29FB236B-0550-21EF-B728-189EE32231F1}"/>
+          <p:cNvPr id="50" name="Picture 49">
+            <a:extLst>
+              <a:ext uri="{FF2B5EF4-FFF2-40B4-BE49-F238E27FC236}">
+                <a16:creationId xmlns:a16="http://schemas.microsoft.com/office/drawing/2014/main" id="{F18174AB-2423-92C5-D3AD-45A5DFD42834}"/>
               </a:ext>
             </a:extLst>
           </p:cNvPr>
@@ -8217,15 +8164,15 @@
           <p:nvPr/>
         </p:nvPicPr>
         <p:blipFill>
-          <a:blip r:embed="rId4"/>
+          <a:blip r:embed="rId3"/>
           <a:stretch>
             <a:fillRect/>
           </a:stretch>
         </p:blipFill>
         <p:spPr>
           <a:xfrm>
-            <a:off x="9865436" y="6080262"/>
-            <a:ext cx="1168400" cy="584200"/>
+            <a:off x="0" y="1505700"/>
+            <a:ext cx="5871357" cy="478022"/>
           </a:xfrm>
           <a:prstGeom prst="rect">
             <a:avLst/>
@@ -8234,10 +8181,46 @@
       </p:pic>
       <p:pic>
         <p:nvPicPr>
-          <p:cNvPr id="41" name="Picture 40" descr="A black and white number&#10;&#10;Description automatically generated">
-            <a:extLst>
-              <a:ext uri="{FF2B5EF4-FFF2-40B4-BE49-F238E27FC236}">
-                <a16:creationId xmlns:a16="http://schemas.microsoft.com/office/drawing/2014/main" id="{B1926C80-6BAC-A651-F654-DEFE7897942B}"/>
+          <p:cNvPr id="3" name="Picture 2">
+            <a:extLst>
+              <a:ext uri="{FF2B5EF4-FFF2-40B4-BE49-F238E27FC236}">
+                <a16:creationId xmlns:a16="http://schemas.microsoft.com/office/drawing/2014/main" id="{F1EDA2C4-A44C-CC5F-92CA-F44187CF8A06}"/>
+              </a:ext>
+            </a:extLst>
+          </p:cNvPr>
+          <p:cNvPicPr>
+            <a:picLocks noChangeAspect="1"/>
+          </p:cNvPicPr>
+          <p:nvPr/>
+        </p:nvPicPr>
+        <p:blipFill>
+          <a:blip r:embed="rId4">
+            <a:extLst>
+              <a:ext uri="{28A0092B-C50C-407E-A947-70E740481C1C}">
+                <a14:useLocalDpi xmlns:a14="http://schemas.microsoft.com/office/drawing/2010/main" val="0"/>
+              </a:ext>
+            </a:extLst>
+          </a:blip>
+          <a:stretch>
+            <a:fillRect/>
+          </a:stretch>
+        </p:blipFill>
+        <p:spPr>
+          <a:xfrm>
+            <a:off x="7027056" y="2366047"/>
+            <a:ext cx="4972050" cy="514350"/>
+          </a:xfrm>
+          <a:prstGeom prst="rect">
+            <a:avLst/>
+          </a:prstGeom>
+        </p:spPr>
+      </p:pic>
+      <p:pic>
+        <p:nvPicPr>
+          <p:cNvPr id="7" name="Picture 6" descr="A close up of numbers&#10;&#10;Description automatically generated">
+            <a:extLst>
+              <a:ext uri="{FF2B5EF4-FFF2-40B4-BE49-F238E27FC236}">
+                <a16:creationId xmlns:a16="http://schemas.microsoft.com/office/drawing/2014/main" id="{79DDA422-238B-A5D3-910A-97C4DAB116A8}"/>
               </a:ext>
             </a:extLst>
           </p:cNvPr>
@@ -8254,8 +8237,8 @@
         </p:blipFill>
         <p:spPr>
           <a:xfrm>
-            <a:off x="6613218" y="5947428"/>
-            <a:ext cx="990600" cy="635000"/>
+            <a:off x="6524318" y="5095237"/>
+            <a:ext cx="4686300" cy="647700"/>
           </a:xfrm>
           <a:prstGeom prst="rect">
             <a:avLst/>
@@ -8264,10 +8247,10 @@
       </p:pic>
       <p:pic>
         <p:nvPicPr>
-          <p:cNvPr id="43" name="Picture 42">
-            <a:extLst>
-              <a:ext uri="{FF2B5EF4-FFF2-40B4-BE49-F238E27FC236}">
-                <a16:creationId xmlns:a16="http://schemas.microsoft.com/office/drawing/2014/main" id="{7D5A5B89-07A6-9B09-D772-985E1D526DA7}"/>
+          <p:cNvPr id="9" name="Picture 8" descr="A close up of numbers&#10;&#10;Description automatically generated">
+            <a:extLst>
+              <a:ext uri="{FF2B5EF4-FFF2-40B4-BE49-F238E27FC236}">
+                <a16:creationId xmlns:a16="http://schemas.microsoft.com/office/drawing/2014/main" id="{DDFB61F0-3C14-AD7F-7857-B0B303E0881D}"/>
               </a:ext>
             </a:extLst>
           </p:cNvPr>
@@ -8284,8 +8267,8 @@
         </p:blipFill>
         <p:spPr>
           <a:xfrm>
-            <a:off x="6307874" y="5285142"/>
-            <a:ext cx="5045926" cy="596143"/>
+            <a:off x="9513081" y="5845828"/>
+            <a:ext cx="1333500" cy="838200"/>
           </a:xfrm>
           <a:prstGeom prst="rect">
             <a:avLst/>
@@ -8294,10 +8277,10 @@
       </p:pic>
       <p:pic>
         <p:nvPicPr>
-          <p:cNvPr id="45" name="Picture 44">
-            <a:extLst>
-              <a:ext uri="{FF2B5EF4-FFF2-40B4-BE49-F238E27FC236}">
-                <a16:creationId xmlns:a16="http://schemas.microsoft.com/office/drawing/2014/main" id="{09F0A7FB-70B7-C919-62FB-487A9DE6D5F8}"/>
+          <p:cNvPr id="13" name="Picture 12" descr="A black and white background with black numbers&#10;&#10;Description automatically generated">
+            <a:extLst>
+              <a:ext uri="{FF2B5EF4-FFF2-40B4-BE49-F238E27FC236}">
+                <a16:creationId xmlns:a16="http://schemas.microsoft.com/office/drawing/2014/main" id="{8B49FB7C-8068-E824-06FC-3FC01B541A79}"/>
               </a:ext>
             </a:extLst>
           </p:cNvPr>
@@ -8314,8 +8297,8 @@
         </p:blipFill>
         <p:spPr>
           <a:xfrm>
-            <a:off x="6868635" y="2418407"/>
-            <a:ext cx="5013216" cy="482187"/>
+            <a:off x="6585977" y="5935696"/>
+            <a:ext cx="927100" cy="698500"/>
           </a:xfrm>
           <a:prstGeom prst="rect">
             <a:avLst/>
@@ -8324,10 +8307,10 @@
       </p:pic>
       <p:pic>
         <p:nvPicPr>
-          <p:cNvPr id="50" name="Picture 49">
-            <a:extLst>
-              <a:ext uri="{FF2B5EF4-FFF2-40B4-BE49-F238E27FC236}">
-                <a16:creationId xmlns:a16="http://schemas.microsoft.com/office/drawing/2014/main" id="{F18174AB-2423-92C5-D3AD-45A5DFD42834}"/>
+          <p:cNvPr id="14" name="Picture 13" descr="A number and letters on a white background&#10;&#10;Description automatically generated">
+            <a:extLst>
+              <a:ext uri="{FF2B5EF4-FFF2-40B4-BE49-F238E27FC236}">
+                <a16:creationId xmlns:a16="http://schemas.microsoft.com/office/drawing/2014/main" id="{ED4EC80D-08E9-E80E-A64A-336E5EE65743}"/>
               </a:ext>
             </a:extLst>
           </p:cNvPr>
@@ -8344,8 +8327,68 @@
         </p:blipFill>
         <p:spPr>
           <a:xfrm>
-            <a:off x="0" y="1505700"/>
-            <a:ext cx="5871357" cy="478022"/>
+            <a:off x="6612119" y="3427411"/>
+            <a:ext cx="5172614" cy="805571"/>
+          </a:xfrm>
+          <a:prstGeom prst="rect">
+            <a:avLst/>
+          </a:prstGeom>
+        </p:spPr>
+      </p:pic>
+      <p:pic>
+        <p:nvPicPr>
+          <p:cNvPr id="16" name="Picture 15" descr="A screenshot of a computer&#10;&#10;Description automatically generated">
+            <a:extLst>
+              <a:ext uri="{FF2B5EF4-FFF2-40B4-BE49-F238E27FC236}">
+                <a16:creationId xmlns:a16="http://schemas.microsoft.com/office/drawing/2014/main" id="{FE8982BD-AA06-CCC6-3DB5-2CC82969E652}"/>
+              </a:ext>
+            </a:extLst>
+          </p:cNvPr>
+          <p:cNvPicPr>
+            <a:picLocks noChangeAspect="1"/>
+          </p:cNvPicPr>
+          <p:nvPr/>
+        </p:nvPicPr>
+        <p:blipFill>
+          <a:blip r:embed="rId9"/>
+          <a:stretch>
+            <a:fillRect/>
+          </a:stretch>
+        </p:blipFill>
+        <p:spPr>
+          <a:xfrm>
+            <a:off x="13090900" y="553446"/>
+            <a:ext cx="7772400" cy="2573435"/>
+          </a:xfrm>
+          <a:prstGeom prst="rect">
+            <a:avLst/>
+          </a:prstGeom>
+        </p:spPr>
+      </p:pic>
+      <p:pic>
+        <p:nvPicPr>
+          <p:cNvPr id="19" name="Picture 18" descr="A screenshot of a computer code&#10;&#10;Description automatically generated">
+            <a:extLst>
+              <a:ext uri="{FF2B5EF4-FFF2-40B4-BE49-F238E27FC236}">
+                <a16:creationId xmlns:a16="http://schemas.microsoft.com/office/drawing/2014/main" id="{05B33CA7-A8DD-6858-8E61-32261D386FF8}"/>
+              </a:ext>
+            </a:extLst>
+          </p:cNvPr>
+          <p:cNvPicPr>
+            <a:picLocks noChangeAspect="1"/>
+          </p:cNvPicPr>
+          <p:nvPr/>
+        </p:nvPicPr>
+        <p:blipFill>
+          <a:blip r:embed="rId10"/>
+          <a:stretch>
+            <a:fillRect/>
+          </a:stretch>
+        </p:blipFill>
+        <p:spPr>
+          <a:xfrm>
+            <a:off x="13090900" y="3225679"/>
+            <a:ext cx="7772400" cy="2480991"/>
           </a:xfrm>
           <a:prstGeom prst="rect">
             <a:avLst/>
@@ -8362,11 +8405,6 @@
   <p:clrMapOvr>
     <a:masterClrMapping/>
   </p:clrMapOvr>
-  <p:extLst>
-    <p:ext uri="{6950BFC3-D8DA-4A85-94F7-54DA5524770B}">
-      <p188:commentRel xmlns:p188="http://schemas.microsoft.com/office/powerpoint/2018/8/main" r:id="rId2"/>
-    </p:ext>
-  </p:extLst>
 </p:sld>
 </file>
 
@@ -8387,12 +8425,273 @@
           <a:chExt cx="0" cy="0"/>
         </a:xfrm>
       </p:grpSpPr>
+      <p:sp>
+        <p:nvSpPr>
+          <p:cNvPr id="2" name="Title 1">
+            <a:extLst>
+              <a:ext uri="{FF2B5EF4-FFF2-40B4-BE49-F238E27FC236}">
+                <a16:creationId xmlns:a16="http://schemas.microsoft.com/office/drawing/2014/main" id="{4E0CF6A0-3CBE-4149-1D7E-A40A8D1F7104}"/>
+              </a:ext>
+            </a:extLst>
+          </p:cNvPr>
+          <p:cNvSpPr>
+            <a:spLocks noGrp="1"/>
+          </p:cNvSpPr>
+          <p:nvPr>
+            <p:ph type="title"/>
+          </p:nvPr>
+        </p:nvSpPr>
+        <p:spPr/>
+        <p:txBody>
+          <a:bodyPr>
+            <a:normAutofit/>
+          </a:bodyPr>
+          <a:lstStyle/>
+          <a:p>
+            <a:r>
+              <a:rPr lang="en-US" sz="3600" dirty="0"/>
+              <a:t>IRSBMF:DEDUCTIBILITY vs. Ours: </a:t>
+            </a:r>
+            <a:r>
+              <a:rPr lang="en-US" sz="3600" dirty="0" err="1"/>
+              <a:t>Donations_deductible</a:t>
+            </a:r>
+            <a:endParaRPr lang="en-US" sz="3600" dirty="0"/>
+          </a:p>
+        </p:txBody>
+      </p:sp>
+      <p:sp>
+        <p:nvSpPr>
+          <p:cNvPr id="20" name="TextBox 19">
+            <a:extLst>
+              <a:ext uri="{FF2B5EF4-FFF2-40B4-BE49-F238E27FC236}">
+                <a16:creationId xmlns:a16="http://schemas.microsoft.com/office/drawing/2014/main" id="{6E04F9D1-7E70-974C-0FB2-1A0F5C4DA787}"/>
+              </a:ext>
+            </a:extLst>
+          </p:cNvPr>
+          <p:cNvSpPr txBox="1"/>
+          <p:nvPr/>
+        </p:nvSpPr>
+        <p:spPr>
+          <a:xfrm>
+            <a:off x="617742" y="3608801"/>
+            <a:ext cx="3736279" cy="369332"/>
+          </a:xfrm>
+          <a:prstGeom prst="rect">
+            <a:avLst/>
+          </a:prstGeom>
+          <a:noFill/>
+        </p:spPr>
+        <p:txBody>
+          <a:bodyPr wrap="none" rtlCol="0">
+            <a:spAutoFit/>
+          </a:bodyPr>
+          <a:lstStyle/>
+          <a:p>
+            <a:r>
+              <a:rPr lang="en-US" dirty="0"/>
+              <a:t>Red box is where our codes </a:t>
+            </a:r>
+            <a:r>
+              <a:rPr lang="en-US" b="1" dirty="0"/>
+              <a:t>should</a:t>
+            </a:r>
+            <a:r>
+              <a:rPr lang="en-US" dirty="0"/>
+              <a:t> be</a:t>
+            </a:r>
+          </a:p>
+        </p:txBody>
+      </p:sp>
+      <p:sp>
+        <p:nvSpPr>
+          <p:cNvPr id="18" name="TextBox 17">
+            <a:extLst>
+              <a:ext uri="{FF2B5EF4-FFF2-40B4-BE49-F238E27FC236}">
+                <a16:creationId xmlns:a16="http://schemas.microsoft.com/office/drawing/2014/main" id="{72A16302-40D2-9A26-1E49-4368B8A87C75}"/>
+              </a:ext>
+            </a:extLst>
+          </p:cNvPr>
+          <p:cNvSpPr txBox="1"/>
+          <p:nvPr/>
+        </p:nvSpPr>
+        <p:spPr>
+          <a:xfrm>
+            <a:off x="4629336" y="3133446"/>
+            <a:ext cx="2017347" cy="369332"/>
+          </a:xfrm>
+          <a:prstGeom prst="rect">
+            <a:avLst/>
+          </a:prstGeom>
+          <a:noFill/>
+        </p:spPr>
+        <p:txBody>
+          <a:bodyPr wrap="none" rtlCol="0">
+            <a:spAutoFit/>
+          </a:bodyPr>
+          <a:lstStyle/>
+          <a:p>
+            <a:r>
+              <a:rPr lang="en-US" dirty="0"/>
+              <a:t>Filing Requirement:</a:t>
+            </a:r>
+          </a:p>
+        </p:txBody>
+      </p:sp>
+      <p:sp>
+        <p:nvSpPr>
+          <p:cNvPr id="27" name="TextBox 26">
+            <a:extLst>
+              <a:ext uri="{FF2B5EF4-FFF2-40B4-BE49-F238E27FC236}">
+                <a16:creationId xmlns:a16="http://schemas.microsoft.com/office/drawing/2014/main" id="{6E3D1FA3-444F-871D-C570-775D4A11E5C2}"/>
+              </a:ext>
+            </a:extLst>
+          </p:cNvPr>
+          <p:cNvSpPr txBox="1"/>
+          <p:nvPr/>
+        </p:nvSpPr>
+        <p:spPr>
+          <a:xfrm>
+            <a:off x="5614770" y="3877763"/>
+            <a:ext cx="849913" cy="369332"/>
+          </a:xfrm>
+          <a:prstGeom prst="rect">
+            <a:avLst/>
+          </a:prstGeom>
+          <a:noFill/>
+        </p:spPr>
+        <p:txBody>
+          <a:bodyPr wrap="none" rtlCol="0">
+            <a:spAutoFit/>
+          </a:bodyPr>
+          <a:lstStyle/>
+          <a:p>
+            <a:r>
+              <a:rPr lang="en-US" dirty="0"/>
+              <a:t>NTEE1:</a:t>
+            </a:r>
+          </a:p>
+        </p:txBody>
+      </p:sp>
+      <p:sp>
+        <p:nvSpPr>
+          <p:cNvPr id="32" name="TextBox 31">
+            <a:extLst>
+              <a:ext uri="{FF2B5EF4-FFF2-40B4-BE49-F238E27FC236}">
+                <a16:creationId xmlns:a16="http://schemas.microsoft.com/office/drawing/2014/main" id="{4E224EBF-770B-8D7E-AA59-9E4427D3F726}"/>
+              </a:ext>
+            </a:extLst>
+          </p:cNvPr>
+          <p:cNvSpPr txBox="1"/>
+          <p:nvPr/>
+        </p:nvSpPr>
+        <p:spPr>
+          <a:xfrm>
+            <a:off x="4680778" y="6080262"/>
+            <a:ext cx="1875385" cy="369332"/>
+          </a:xfrm>
+          <a:prstGeom prst="rect">
+            <a:avLst/>
+          </a:prstGeom>
+          <a:noFill/>
+        </p:spPr>
+        <p:txBody>
+          <a:bodyPr wrap="none" rtlCol="0">
+            <a:spAutoFit/>
+          </a:bodyPr>
+          <a:lstStyle/>
+          <a:p>
+            <a:r>
+              <a:rPr lang="en-US" dirty="0" err="1"/>
+              <a:t>Govt_established</a:t>
+            </a:r>
+            <a:r>
+              <a:rPr lang="en-US" dirty="0"/>
+              <a:t>:</a:t>
+            </a:r>
+          </a:p>
+        </p:txBody>
+      </p:sp>
+      <p:sp>
+        <p:nvSpPr>
+          <p:cNvPr id="35" name="TextBox 34">
+            <a:extLst>
+              <a:ext uri="{FF2B5EF4-FFF2-40B4-BE49-F238E27FC236}">
+                <a16:creationId xmlns:a16="http://schemas.microsoft.com/office/drawing/2014/main" id="{61BDC008-7BF7-024F-06EF-9E3F58E5D51B}"/>
+              </a:ext>
+            </a:extLst>
+          </p:cNvPr>
+          <p:cNvSpPr txBox="1"/>
+          <p:nvPr/>
+        </p:nvSpPr>
+        <p:spPr>
+          <a:xfrm>
+            <a:off x="5582587" y="2464244"/>
+            <a:ext cx="1436675" cy="369332"/>
+          </a:xfrm>
+          <a:prstGeom prst="rect">
+            <a:avLst/>
+          </a:prstGeom>
+          <a:noFill/>
+        </p:spPr>
+        <p:txBody>
+          <a:bodyPr wrap="none" rtlCol="0">
+            <a:spAutoFit/>
+          </a:bodyPr>
+          <a:lstStyle/>
+          <a:p>
+            <a:r>
+              <a:rPr lang="en-US" dirty="0"/>
+              <a:t>SUBSECTION:</a:t>
+            </a:r>
+          </a:p>
+        </p:txBody>
+      </p:sp>
+      <p:sp>
+        <p:nvSpPr>
+          <p:cNvPr id="37" name="TextBox 36">
+            <a:extLst>
+              <a:ext uri="{FF2B5EF4-FFF2-40B4-BE49-F238E27FC236}">
+                <a16:creationId xmlns:a16="http://schemas.microsoft.com/office/drawing/2014/main" id="{60BAD4C9-EB91-AF45-2A51-70F43A2F017E}"/>
+              </a:ext>
+            </a:extLst>
+          </p:cNvPr>
+          <p:cNvSpPr txBox="1"/>
+          <p:nvPr/>
+        </p:nvSpPr>
+        <p:spPr>
+          <a:xfrm>
+            <a:off x="4157132" y="5268643"/>
+            <a:ext cx="2367186" cy="369332"/>
+          </a:xfrm>
+          <a:prstGeom prst="rect">
+            <a:avLst/>
+          </a:prstGeom>
+          <a:noFill/>
+        </p:spPr>
+        <p:txBody>
+          <a:bodyPr wrap="none" rtlCol="0">
+            <a:spAutoFit/>
+          </a:bodyPr>
+          <a:lstStyle/>
+          <a:p>
+            <a:r>
+              <a:rPr lang="en-US" dirty="0" err="1"/>
+              <a:t>Tax_exempt_subgroup</a:t>
+            </a:r>
+            <a:r>
+              <a:rPr lang="en-US" dirty="0"/>
+              <a:t>:</a:t>
+            </a:r>
+          </a:p>
+        </p:txBody>
+      </p:sp>
       <p:pic>
         <p:nvPicPr>
-          <p:cNvPr id="36" name="Picture 35" descr="A number and number on a white background&#10;&#10;Description automatically generated">
-            <a:extLst>
-              <a:ext uri="{FF2B5EF4-FFF2-40B4-BE49-F238E27FC236}">
-                <a16:creationId xmlns:a16="http://schemas.microsoft.com/office/drawing/2014/main" id="{1B895EE1-2694-08C9-5076-9CCEBBFEDFB3}"/>
+          <p:cNvPr id="15" name="Picture 14" descr="A number and number on a white background&#10;&#10;Description automatically generated">
+            <a:extLst>
+              <a:ext uri="{FF2B5EF4-FFF2-40B4-BE49-F238E27FC236}">
+                <a16:creationId xmlns:a16="http://schemas.microsoft.com/office/drawing/2014/main" id="{50688457-DBBF-DD3B-8B28-1671A0CE0CFB}"/>
               </a:ext>
             </a:extLst>
           </p:cNvPr>
@@ -8419,45 +8718,10 @@
       </p:pic>
       <p:sp>
         <p:nvSpPr>
-          <p:cNvPr id="2" name="Title 1">
-            <a:extLst>
-              <a:ext uri="{FF2B5EF4-FFF2-40B4-BE49-F238E27FC236}">
-                <a16:creationId xmlns:a16="http://schemas.microsoft.com/office/drawing/2014/main" id="{4E0CF6A0-3CBE-4149-1D7E-A40A8D1F7104}"/>
-              </a:ext>
-            </a:extLst>
-          </p:cNvPr>
-          <p:cNvSpPr>
-            <a:spLocks noGrp="1"/>
-          </p:cNvSpPr>
-          <p:nvPr>
-            <p:ph type="title"/>
-          </p:nvPr>
-        </p:nvSpPr>
-        <p:spPr/>
-        <p:txBody>
-          <a:bodyPr>
-            <a:normAutofit/>
-          </a:bodyPr>
-          <a:lstStyle/>
-          <a:p>
-            <a:r>
-              <a:rPr lang="en-US" sz="3600" dirty="0"/>
-              <a:t>IRSBMF:DEDUCTIBILITY vs. Ours: </a:t>
-            </a:r>
-            <a:r>
-              <a:rPr lang="en-US" sz="3600" dirty="0" err="1"/>
-              <a:t>Donations_deductible</a:t>
-            </a:r>
-            <a:endParaRPr lang="en-US" sz="3600" dirty="0"/>
-          </a:p>
-        </p:txBody>
-      </p:sp>
-      <p:sp>
-        <p:nvSpPr>
-          <p:cNvPr id="20" name="TextBox 19">
-            <a:extLst>
-              <a:ext uri="{FF2B5EF4-FFF2-40B4-BE49-F238E27FC236}">
-                <a16:creationId xmlns:a16="http://schemas.microsoft.com/office/drawing/2014/main" id="{6E04F9D1-7E70-974C-0FB2-1A0F5C4DA787}"/>
+          <p:cNvPr id="16" name="TextBox 15">
+            <a:extLst>
+              <a:ext uri="{FF2B5EF4-FFF2-40B4-BE49-F238E27FC236}">
+                <a16:creationId xmlns:a16="http://schemas.microsoft.com/office/drawing/2014/main" id="{43F8CB51-3AA3-77E5-F88F-E2A9D8C680C9}"/>
               </a:ext>
             </a:extLst>
           </p:cNvPr>
@@ -8497,10 +8761,10 @@
       </p:sp>
       <p:sp>
         <p:nvSpPr>
-          <p:cNvPr id="21" name="Rectangle 20">
-            <a:extLst>
-              <a:ext uri="{FF2B5EF4-FFF2-40B4-BE49-F238E27FC236}">
-                <a16:creationId xmlns:a16="http://schemas.microsoft.com/office/drawing/2014/main" id="{DD557CAD-386A-35C8-3FFE-D9978B365274}"/>
+          <p:cNvPr id="17" name="Rectangle 16">
+            <a:extLst>
+              <a:ext uri="{FF2B5EF4-FFF2-40B4-BE49-F238E27FC236}">
+                <a16:creationId xmlns:a16="http://schemas.microsoft.com/office/drawing/2014/main" id="{92CD9287-0D65-6FE1-7BA1-F0C8B17FCFD4}"/>
               </a:ext>
             </a:extLst>
           </p:cNvPr>
@@ -8549,10 +8813,10 @@
       </p:sp>
       <p:sp>
         <p:nvSpPr>
-          <p:cNvPr id="22" name="Rectangle 21">
-            <a:extLst>
-              <a:ext uri="{FF2B5EF4-FFF2-40B4-BE49-F238E27FC236}">
-                <a16:creationId xmlns:a16="http://schemas.microsoft.com/office/drawing/2014/main" id="{A7A97C1B-8FF9-8655-DF30-3B7A376224FC}"/>
+          <p:cNvPr id="19" name="Rectangle 18">
+            <a:extLst>
+              <a:ext uri="{FF2B5EF4-FFF2-40B4-BE49-F238E27FC236}">
+                <a16:creationId xmlns:a16="http://schemas.microsoft.com/office/drawing/2014/main" id="{FBF38442-8E7E-D6DE-226D-452A5ED66539}"/>
               </a:ext>
             </a:extLst>
           </p:cNvPr>
@@ -8601,10 +8865,10 @@
       </p:sp>
       <p:sp>
         <p:nvSpPr>
-          <p:cNvPr id="23" name="Rectangle 22">
-            <a:extLst>
-              <a:ext uri="{FF2B5EF4-FFF2-40B4-BE49-F238E27FC236}">
-                <a16:creationId xmlns:a16="http://schemas.microsoft.com/office/drawing/2014/main" id="{26FE66FE-498D-ACF7-3A5D-3EA6E8BA5350}"/>
+          <p:cNvPr id="26" name="Rectangle 25">
+            <a:extLst>
+              <a:ext uri="{FF2B5EF4-FFF2-40B4-BE49-F238E27FC236}">
+                <a16:creationId xmlns:a16="http://schemas.microsoft.com/office/drawing/2014/main" id="{6A3DA263-DCF7-7FEA-A9B8-9FBF9D49ADFB}"/>
               </a:ext>
             </a:extLst>
           </p:cNvPr>
@@ -8653,10 +8917,10 @@
       </p:sp>
       <p:sp>
         <p:nvSpPr>
-          <p:cNvPr id="24" name="Rectangle 23">
-            <a:extLst>
-              <a:ext uri="{FF2B5EF4-FFF2-40B4-BE49-F238E27FC236}">
-                <a16:creationId xmlns:a16="http://schemas.microsoft.com/office/drawing/2014/main" id="{1F0DFD7B-5361-9795-7158-82DEFFCA3392}"/>
+          <p:cNvPr id="28" name="Rectangle 27">
+            <a:extLst>
+              <a:ext uri="{FF2B5EF4-FFF2-40B4-BE49-F238E27FC236}">
+                <a16:creationId xmlns:a16="http://schemas.microsoft.com/office/drawing/2014/main" id="{8C203894-4123-7502-37E3-CBDDD0117F01}"/>
               </a:ext>
             </a:extLst>
           </p:cNvPr>
@@ -8705,10 +8969,10 @@
       </p:sp>
       <p:sp>
         <p:nvSpPr>
-          <p:cNvPr id="25" name="Rectangle 24">
-            <a:extLst>
-              <a:ext uri="{FF2B5EF4-FFF2-40B4-BE49-F238E27FC236}">
-                <a16:creationId xmlns:a16="http://schemas.microsoft.com/office/drawing/2014/main" id="{A9E3DD65-271C-0E40-9517-BB3209F82617}"/>
+          <p:cNvPr id="30" name="Rectangle 29">
+            <a:extLst>
+              <a:ext uri="{FF2B5EF4-FFF2-40B4-BE49-F238E27FC236}">
+                <a16:creationId xmlns:a16="http://schemas.microsoft.com/office/drawing/2014/main" id="{6A069445-8B2D-0519-CDF3-5BFB45848C8C}"/>
               </a:ext>
             </a:extLst>
           </p:cNvPr>
@@ -8757,10 +9021,10 @@
       </p:sp>
       <p:sp>
         <p:nvSpPr>
-          <p:cNvPr id="5" name="Oval 4">
-            <a:extLst>
-              <a:ext uri="{FF2B5EF4-FFF2-40B4-BE49-F238E27FC236}">
-                <a16:creationId xmlns:a16="http://schemas.microsoft.com/office/drawing/2014/main" id="{69CF7B29-3F08-E7C8-8453-17D08BBAD4C8}"/>
+          <p:cNvPr id="31" name="Oval 30">
+            <a:extLst>
+              <a:ext uri="{FF2B5EF4-FFF2-40B4-BE49-F238E27FC236}">
+                <a16:creationId xmlns:a16="http://schemas.microsoft.com/office/drawing/2014/main" id="{9B5AA43F-72FD-22FB-BC23-C5A6FD749D75}"/>
               </a:ext>
             </a:extLst>
           </p:cNvPr>
@@ -8769,8 +9033,8 @@
         </p:nvSpPr>
         <p:spPr>
           <a:xfrm>
-            <a:off x="1725749" y="2409435"/>
-            <a:ext cx="800578" cy="569842"/>
+            <a:off x="2625008" y="2701096"/>
+            <a:ext cx="1970549" cy="569842"/>
           </a:xfrm>
           <a:prstGeom prst="ellipse">
             <a:avLst/>
@@ -8809,23 +9073,23 @@
       </p:sp>
       <p:cxnSp>
         <p:nvCxnSpPr>
-          <p:cNvPr id="6" name="Straight Arrow Connector 5">
-            <a:extLst>
-              <a:ext uri="{FF2B5EF4-FFF2-40B4-BE49-F238E27FC236}">
-                <a16:creationId xmlns:a16="http://schemas.microsoft.com/office/drawing/2014/main" id="{49397113-7103-06C3-2C69-E8E321C1D0E6}"/>
+          <p:cNvPr id="34" name="Straight Arrow Connector 33">
+            <a:extLst>
+              <a:ext uri="{FF2B5EF4-FFF2-40B4-BE49-F238E27FC236}">
+                <a16:creationId xmlns:a16="http://schemas.microsoft.com/office/drawing/2014/main" id="{04883DA6-2512-9801-B0DB-67709843B96C}"/>
               </a:ext>
             </a:extLst>
           </p:cNvPr>
           <p:cNvCxnSpPr>
             <a:cxnSpLocks/>
-            <a:stCxn id="5" idx="6"/>
+            <a:stCxn id="31" idx="6"/>
           </p:cNvCxnSpPr>
           <p:nvPr/>
         </p:nvCxnSpPr>
         <p:spPr>
           <a:xfrm flipV="1">
-            <a:off x="2526327" y="2124514"/>
-            <a:ext cx="2523345" cy="569842"/>
+            <a:off x="4595557" y="2589244"/>
+            <a:ext cx="781684" cy="396773"/>
           </a:xfrm>
           <a:prstGeom prst="straightConnector1">
             <a:avLst/>
@@ -8849,335 +9113,12 @@
           </a:fontRef>
         </p:style>
       </p:cxnSp>
-      <p:sp>
-        <p:nvSpPr>
-          <p:cNvPr id="10" name="TextBox 9">
-            <a:extLst>
-              <a:ext uri="{FF2B5EF4-FFF2-40B4-BE49-F238E27FC236}">
-                <a16:creationId xmlns:a16="http://schemas.microsoft.com/office/drawing/2014/main" id="{18292492-FC48-AD2D-BD0C-921536F5F77A}"/>
-              </a:ext>
-            </a:extLst>
-          </p:cNvPr>
-          <p:cNvSpPr txBox="1"/>
-          <p:nvPr/>
-        </p:nvSpPr>
-        <p:spPr>
-          <a:xfrm>
-            <a:off x="5871357" y="1899417"/>
-            <a:ext cx="952312" cy="369332"/>
-          </a:xfrm>
-          <a:prstGeom prst="rect">
-            <a:avLst/>
-          </a:prstGeom>
-          <a:noFill/>
-        </p:spPr>
-        <p:txBody>
-          <a:bodyPr wrap="none" rtlCol="0">
-            <a:spAutoFit/>
-          </a:bodyPr>
-          <a:lstStyle/>
-          <a:p>
-            <a:r>
-              <a:rPr lang="en-US" dirty="0"/>
-              <a:t>Level 1: </a:t>
-            </a:r>
-          </a:p>
-        </p:txBody>
-      </p:sp>
-      <p:sp>
-        <p:nvSpPr>
-          <p:cNvPr id="11" name="TextBox 10">
-            <a:extLst>
-              <a:ext uri="{FF2B5EF4-FFF2-40B4-BE49-F238E27FC236}">
-                <a16:creationId xmlns:a16="http://schemas.microsoft.com/office/drawing/2014/main" id="{94FFE3EB-4E25-B899-8610-911764F80C5F}"/>
-              </a:ext>
-            </a:extLst>
-          </p:cNvPr>
-          <p:cNvSpPr txBox="1"/>
-          <p:nvPr/>
-        </p:nvSpPr>
-        <p:spPr>
-          <a:xfrm>
-            <a:off x="8560769" y="1690688"/>
-            <a:ext cx="952312" cy="369332"/>
-          </a:xfrm>
-          <a:prstGeom prst="rect">
-            <a:avLst/>
-          </a:prstGeom>
-          <a:noFill/>
-        </p:spPr>
-        <p:txBody>
-          <a:bodyPr wrap="none" rtlCol="0">
-            <a:spAutoFit/>
-          </a:bodyPr>
-          <a:lstStyle/>
-          <a:p>
-            <a:r>
-              <a:rPr lang="en-US" dirty="0"/>
-              <a:t>Level 2: </a:t>
-            </a:r>
-          </a:p>
-        </p:txBody>
-      </p:sp>
-      <p:sp>
-        <p:nvSpPr>
-          <p:cNvPr id="18" name="TextBox 17">
-            <a:extLst>
-              <a:ext uri="{FF2B5EF4-FFF2-40B4-BE49-F238E27FC236}">
-                <a16:creationId xmlns:a16="http://schemas.microsoft.com/office/drawing/2014/main" id="{72A16302-40D2-9A26-1E49-4368B8A87C75}"/>
-              </a:ext>
-            </a:extLst>
-          </p:cNvPr>
-          <p:cNvSpPr txBox="1"/>
-          <p:nvPr/>
-        </p:nvSpPr>
-        <p:spPr>
-          <a:xfrm>
-            <a:off x="5810337" y="3001261"/>
-            <a:ext cx="654346" cy="369332"/>
-          </a:xfrm>
-          <a:prstGeom prst="rect">
-            <a:avLst/>
-          </a:prstGeom>
-          <a:noFill/>
-        </p:spPr>
-        <p:txBody>
-          <a:bodyPr wrap="none" rtlCol="0">
-            <a:spAutoFit/>
-          </a:bodyPr>
-          <a:lstStyle/>
-          <a:p>
-            <a:r>
-              <a:rPr lang="en-US" dirty="0"/>
-              <a:t>Filer:</a:t>
-            </a:r>
-          </a:p>
-        </p:txBody>
-      </p:sp>
-      <p:sp>
-        <p:nvSpPr>
-          <p:cNvPr id="27" name="TextBox 26">
-            <a:extLst>
-              <a:ext uri="{FF2B5EF4-FFF2-40B4-BE49-F238E27FC236}">
-                <a16:creationId xmlns:a16="http://schemas.microsoft.com/office/drawing/2014/main" id="{6E3D1FA3-444F-871D-C570-775D4A11E5C2}"/>
-              </a:ext>
-            </a:extLst>
-          </p:cNvPr>
-          <p:cNvSpPr txBox="1"/>
-          <p:nvPr/>
-        </p:nvSpPr>
-        <p:spPr>
-          <a:xfrm>
-            <a:off x="5692679" y="3628214"/>
-            <a:ext cx="849913" cy="369332"/>
-          </a:xfrm>
-          <a:prstGeom prst="rect">
-            <a:avLst/>
-          </a:prstGeom>
-          <a:noFill/>
-        </p:spPr>
-        <p:txBody>
-          <a:bodyPr wrap="none" rtlCol="0">
-            <a:spAutoFit/>
-          </a:bodyPr>
-          <a:lstStyle/>
-          <a:p>
-            <a:r>
-              <a:rPr lang="en-US" dirty="0"/>
-              <a:t>NTEE1:</a:t>
-            </a:r>
-          </a:p>
-        </p:txBody>
-      </p:sp>
-      <p:sp>
-        <p:nvSpPr>
-          <p:cNvPr id="29" name="TextBox 28">
-            <a:extLst>
-              <a:ext uri="{FF2B5EF4-FFF2-40B4-BE49-F238E27FC236}">
-                <a16:creationId xmlns:a16="http://schemas.microsoft.com/office/drawing/2014/main" id="{2FA831B0-9E2C-633F-A19F-AA18E93EECD7}"/>
-              </a:ext>
-            </a:extLst>
-          </p:cNvPr>
-          <p:cNvSpPr txBox="1"/>
-          <p:nvPr/>
-        </p:nvSpPr>
-        <p:spPr>
-          <a:xfrm>
-            <a:off x="5621625" y="4573203"/>
-            <a:ext cx="846514" cy="369332"/>
-          </a:xfrm>
-          <a:prstGeom prst="rect">
-            <a:avLst/>
-          </a:prstGeom>
-          <a:noFill/>
-        </p:spPr>
-        <p:txBody>
-          <a:bodyPr wrap="none" rtlCol="0">
-            <a:spAutoFit/>
-          </a:bodyPr>
-          <a:lstStyle/>
-          <a:p>
-            <a:r>
-              <a:rPr lang="en-US" dirty="0"/>
-              <a:t>Level3:</a:t>
-            </a:r>
-          </a:p>
-        </p:txBody>
-      </p:sp>
-      <p:sp>
-        <p:nvSpPr>
-          <p:cNvPr id="32" name="TextBox 31">
-            <a:extLst>
-              <a:ext uri="{FF2B5EF4-FFF2-40B4-BE49-F238E27FC236}">
-                <a16:creationId xmlns:a16="http://schemas.microsoft.com/office/drawing/2014/main" id="{4E224EBF-770B-8D7E-AA59-9E4427D3F726}"/>
-              </a:ext>
-            </a:extLst>
-          </p:cNvPr>
-          <p:cNvSpPr txBox="1"/>
-          <p:nvPr/>
-        </p:nvSpPr>
-        <p:spPr>
-          <a:xfrm>
-            <a:off x="4680778" y="6080262"/>
-            <a:ext cx="1875385" cy="369332"/>
-          </a:xfrm>
-          <a:prstGeom prst="rect">
-            <a:avLst/>
-          </a:prstGeom>
-          <a:noFill/>
-        </p:spPr>
-        <p:txBody>
-          <a:bodyPr wrap="none" rtlCol="0">
-            <a:spAutoFit/>
-          </a:bodyPr>
-          <a:lstStyle/>
-          <a:p>
-            <a:r>
-              <a:rPr lang="en-US" dirty="0" err="1"/>
-              <a:t>Govt_established</a:t>
-            </a:r>
-            <a:r>
-              <a:rPr lang="en-US" dirty="0"/>
-              <a:t>:</a:t>
-            </a:r>
-          </a:p>
-        </p:txBody>
-      </p:sp>
-      <p:sp>
-        <p:nvSpPr>
-          <p:cNvPr id="33" name="TextBox 32">
-            <a:extLst>
-              <a:ext uri="{FF2B5EF4-FFF2-40B4-BE49-F238E27FC236}">
-                <a16:creationId xmlns:a16="http://schemas.microsoft.com/office/drawing/2014/main" id="{C01E79AB-7CE7-4138-9DFF-B87769BEE140}"/>
-              </a:ext>
-            </a:extLst>
-          </p:cNvPr>
-          <p:cNvSpPr txBox="1"/>
-          <p:nvPr/>
-        </p:nvSpPr>
-        <p:spPr>
-          <a:xfrm>
-            <a:off x="8531416" y="6121811"/>
-            <a:ext cx="1334020" cy="369332"/>
-          </a:xfrm>
-          <a:prstGeom prst="rect">
-            <a:avLst/>
-          </a:prstGeom>
-          <a:noFill/>
-        </p:spPr>
-        <p:txBody>
-          <a:bodyPr wrap="none" rtlCol="0">
-            <a:spAutoFit/>
-          </a:bodyPr>
-          <a:lstStyle/>
-          <a:p>
-            <a:r>
-              <a:rPr lang="en-US" dirty="0"/>
-              <a:t>Supporting: </a:t>
-            </a:r>
-          </a:p>
-        </p:txBody>
-      </p:sp>
-      <p:sp>
-        <p:nvSpPr>
-          <p:cNvPr id="35" name="TextBox 34">
-            <a:extLst>
-              <a:ext uri="{FF2B5EF4-FFF2-40B4-BE49-F238E27FC236}">
-                <a16:creationId xmlns:a16="http://schemas.microsoft.com/office/drawing/2014/main" id="{61BDC008-7BF7-024F-06EF-9E3F58E5D51B}"/>
-              </a:ext>
-            </a:extLst>
-          </p:cNvPr>
-          <p:cNvSpPr txBox="1"/>
-          <p:nvPr/>
-        </p:nvSpPr>
-        <p:spPr>
-          <a:xfrm>
-            <a:off x="5582587" y="2464244"/>
-            <a:ext cx="1436675" cy="369332"/>
-          </a:xfrm>
-          <a:prstGeom prst="rect">
-            <a:avLst/>
-          </a:prstGeom>
-          <a:noFill/>
-        </p:spPr>
-        <p:txBody>
-          <a:bodyPr wrap="none" rtlCol="0">
-            <a:spAutoFit/>
-          </a:bodyPr>
-          <a:lstStyle/>
-          <a:p>
-            <a:r>
-              <a:rPr lang="en-US" dirty="0"/>
-              <a:t>SUBSECTION:</a:t>
-            </a:r>
-          </a:p>
-        </p:txBody>
-      </p:sp>
-      <p:sp>
-        <p:nvSpPr>
-          <p:cNvPr id="37" name="TextBox 36">
-            <a:extLst>
-              <a:ext uri="{FF2B5EF4-FFF2-40B4-BE49-F238E27FC236}">
-                <a16:creationId xmlns:a16="http://schemas.microsoft.com/office/drawing/2014/main" id="{60BAD4C9-EB91-AF45-2A51-70F43A2F017E}"/>
-              </a:ext>
-            </a:extLst>
-          </p:cNvPr>
-          <p:cNvSpPr txBox="1"/>
-          <p:nvPr/>
-        </p:nvSpPr>
-        <p:spPr>
-          <a:xfrm>
-            <a:off x="4157132" y="5268643"/>
-            <a:ext cx="2367186" cy="369332"/>
-          </a:xfrm>
-          <a:prstGeom prst="rect">
-            <a:avLst/>
-          </a:prstGeom>
-          <a:noFill/>
-        </p:spPr>
-        <p:txBody>
-          <a:bodyPr wrap="none" rtlCol="0">
-            <a:spAutoFit/>
-          </a:bodyPr>
-          <a:lstStyle/>
-          <a:p>
-            <a:r>
-              <a:rPr lang="en-US" dirty="0" err="1"/>
-              <a:t>Tax_exempt_subgroup</a:t>
-            </a:r>
-            <a:r>
-              <a:rPr lang="en-US" dirty="0"/>
-              <a:t>:</a:t>
-            </a:r>
-          </a:p>
-        </p:txBody>
-      </p:sp>
       <p:pic>
         <p:nvPicPr>
-          <p:cNvPr id="38" name="Picture 37">
-            <a:extLst>
-              <a:ext uri="{FF2B5EF4-FFF2-40B4-BE49-F238E27FC236}">
-                <a16:creationId xmlns:a16="http://schemas.microsoft.com/office/drawing/2014/main" id="{DCE63849-FEED-017A-BC1D-D3BB8B9B2E3E}"/>
+          <p:cNvPr id="40" name="Picture 39">
+            <a:extLst>
+              <a:ext uri="{FF2B5EF4-FFF2-40B4-BE49-F238E27FC236}">
+                <a16:creationId xmlns:a16="http://schemas.microsoft.com/office/drawing/2014/main" id="{F3FBE280-BD68-A3E9-4C7F-F69A70A1BD6F}"/>
               </a:ext>
             </a:extLst>
           </p:cNvPr>
@@ -9204,10 +9145,10 @@
       </p:pic>
       <p:pic>
         <p:nvPicPr>
-          <p:cNvPr id="42" name="Picture 41" descr="A number on a white background&#10;&#10;Description automatically generated">
-            <a:extLst>
-              <a:ext uri="{FF2B5EF4-FFF2-40B4-BE49-F238E27FC236}">
-                <a16:creationId xmlns:a16="http://schemas.microsoft.com/office/drawing/2014/main" id="{9AFA1676-1350-D018-A2D9-8B0981B7AFC0}"/>
+          <p:cNvPr id="47" name="Picture 46" descr="A number with numbers on it&#10;&#10;Description automatically generated with medium confidence">
+            <a:extLst>
+              <a:ext uri="{FF2B5EF4-FFF2-40B4-BE49-F238E27FC236}">
+                <a16:creationId xmlns:a16="http://schemas.microsoft.com/office/drawing/2014/main" id="{60142687-7143-E808-5B65-E55E1DF11D8A}"/>
               </a:ext>
             </a:extLst>
           </p:cNvPr>
@@ -9224,8 +9165,193 @@
         </p:blipFill>
         <p:spPr>
           <a:xfrm>
-            <a:off x="7126151" y="2157227"/>
-            <a:ext cx="4777444" cy="735690"/>
+            <a:off x="6928521" y="2340388"/>
+            <a:ext cx="3987800" cy="749300"/>
+          </a:xfrm>
+          <a:prstGeom prst="rect">
+            <a:avLst/>
+          </a:prstGeom>
+        </p:spPr>
+      </p:pic>
+      <p:sp>
+        <p:nvSpPr>
+          <p:cNvPr id="48" name="TextBox 47">
+            <a:extLst>
+              <a:ext uri="{FF2B5EF4-FFF2-40B4-BE49-F238E27FC236}">
+                <a16:creationId xmlns:a16="http://schemas.microsoft.com/office/drawing/2014/main" id="{A7A4CCB8-CC7C-332F-F031-322BE9B259E1}"/>
+              </a:ext>
+            </a:extLst>
+          </p:cNvPr>
+          <p:cNvSpPr txBox="1"/>
+          <p:nvPr/>
+        </p:nvSpPr>
+        <p:spPr>
+          <a:xfrm>
+            <a:off x="8666921" y="6123543"/>
+            <a:ext cx="1218603" cy="369332"/>
+          </a:xfrm>
+          <a:prstGeom prst="rect">
+            <a:avLst/>
+          </a:prstGeom>
+          <a:noFill/>
+        </p:spPr>
+        <p:txBody>
+          <a:bodyPr wrap="none" rtlCol="0">
+            <a:spAutoFit/>
+          </a:bodyPr>
+          <a:lstStyle/>
+          <a:p>
+            <a:r>
+              <a:rPr lang="en-US" dirty="0"/>
+              <a:t>Supporting</a:t>
+            </a:r>
+          </a:p>
+        </p:txBody>
+      </p:sp>
+      <p:pic>
+        <p:nvPicPr>
+          <p:cNvPr id="50" name="Picture 49" descr="A close-up of numbers&#10;&#10;Description automatically generated">
+            <a:extLst>
+              <a:ext uri="{FF2B5EF4-FFF2-40B4-BE49-F238E27FC236}">
+                <a16:creationId xmlns:a16="http://schemas.microsoft.com/office/drawing/2014/main" id="{AF448DCD-3F64-AB92-EACC-DA193BF96314}"/>
+              </a:ext>
+            </a:extLst>
+          </p:cNvPr>
+          <p:cNvPicPr>
+            <a:picLocks noChangeAspect="1"/>
+          </p:cNvPicPr>
+          <p:nvPr/>
+        </p:nvPicPr>
+        <p:blipFill>
+          <a:blip r:embed="rId6"/>
+          <a:stretch>
+            <a:fillRect/>
+          </a:stretch>
+        </p:blipFill>
+        <p:spPr>
+          <a:xfrm>
+            <a:off x="9885524" y="5927209"/>
+            <a:ext cx="1295400" cy="762000"/>
+          </a:xfrm>
+          <a:prstGeom prst="rect">
+            <a:avLst/>
+          </a:prstGeom>
+        </p:spPr>
+      </p:pic>
+      <p:pic>
+        <p:nvPicPr>
+          <p:cNvPr id="52" name="Picture 51" descr="A black text with black letters&#10;&#10;Description automatically generated">
+            <a:extLst>
+              <a:ext uri="{FF2B5EF4-FFF2-40B4-BE49-F238E27FC236}">
+                <a16:creationId xmlns:a16="http://schemas.microsoft.com/office/drawing/2014/main" id="{3CAB4900-7994-411D-0F79-412463FC45E1}"/>
+              </a:ext>
+            </a:extLst>
+          </p:cNvPr>
+          <p:cNvPicPr>
+            <a:picLocks noChangeAspect="1"/>
+          </p:cNvPicPr>
+          <p:nvPr/>
+        </p:nvPicPr>
+        <p:blipFill>
+          <a:blip r:embed="rId7"/>
+          <a:stretch>
+            <a:fillRect/>
+          </a:stretch>
+        </p:blipFill>
+        <p:spPr>
+          <a:xfrm>
+            <a:off x="6464683" y="5896495"/>
+            <a:ext cx="1752600" cy="673100"/>
+          </a:xfrm>
+          <a:prstGeom prst="rect">
+            <a:avLst/>
+          </a:prstGeom>
+        </p:spPr>
+      </p:pic>
+      <p:pic>
+        <p:nvPicPr>
+          <p:cNvPr id="54" name="Picture 53" descr="A close up of numbers&#10;&#10;Description automatically generated">
+            <a:extLst>
+              <a:ext uri="{FF2B5EF4-FFF2-40B4-BE49-F238E27FC236}">
+                <a16:creationId xmlns:a16="http://schemas.microsoft.com/office/drawing/2014/main" id="{C35C9A28-6CCC-27FC-24C8-D0FF0F6F6C2A}"/>
+              </a:ext>
+            </a:extLst>
+          </p:cNvPr>
+          <p:cNvPicPr>
+            <a:picLocks noChangeAspect="1"/>
+          </p:cNvPicPr>
+          <p:nvPr/>
+        </p:nvPicPr>
+        <p:blipFill>
+          <a:blip r:embed="rId8"/>
+          <a:stretch>
+            <a:fillRect/>
+          </a:stretch>
+        </p:blipFill>
+        <p:spPr>
+          <a:xfrm>
+            <a:off x="6556163" y="5164801"/>
+            <a:ext cx="2641600" cy="635000"/>
+          </a:xfrm>
+          <a:prstGeom prst="rect">
+            <a:avLst/>
+          </a:prstGeom>
+        </p:spPr>
+      </p:pic>
+      <p:pic>
+        <p:nvPicPr>
+          <p:cNvPr id="56" name="Picture 55" descr="A close-up of numbers&#10;&#10;Description automatically generated">
+            <a:extLst>
+              <a:ext uri="{FF2B5EF4-FFF2-40B4-BE49-F238E27FC236}">
+                <a16:creationId xmlns:a16="http://schemas.microsoft.com/office/drawing/2014/main" id="{0331116C-445E-74E9-84BD-0DE1E08CE2B1}"/>
+              </a:ext>
+            </a:extLst>
+          </p:cNvPr>
+          <p:cNvPicPr>
+            <a:picLocks noChangeAspect="1"/>
+          </p:cNvPicPr>
+          <p:nvPr/>
+        </p:nvPicPr>
+        <p:blipFill>
+          <a:blip r:embed="rId9"/>
+          <a:stretch>
+            <a:fillRect/>
+          </a:stretch>
+        </p:blipFill>
+        <p:spPr>
+          <a:xfrm>
+            <a:off x="6524318" y="3863244"/>
+            <a:ext cx="4552950" cy="666750"/>
+          </a:xfrm>
+          <a:prstGeom prst="rect">
+            <a:avLst/>
+          </a:prstGeom>
+        </p:spPr>
+      </p:pic>
+      <p:pic>
+        <p:nvPicPr>
+          <p:cNvPr id="58" name="Picture 57" descr="A number and a number&#10;&#10;Description automatically generated with medium confidence">
+            <a:extLst>
+              <a:ext uri="{FF2B5EF4-FFF2-40B4-BE49-F238E27FC236}">
+                <a16:creationId xmlns:a16="http://schemas.microsoft.com/office/drawing/2014/main" id="{91B9693A-5597-92A1-EE72-B1D3ABDAC75F}"/>
+              </a:ext>
+            </a:extLst>
+          </p:cNvPr>
+          <p:cNvPicPr>
+            <a:picLocks noChangeAspect="1"/>
+          </p:cNvPicPr>
+          <p:nvPr/>
+        </p:nvPicPr>
+        <p:blipFill>
+          <a:blip r:embed="rId10"/>
+          <a:stretch>
+            <a:fillRect/>
+          </a:stretch>
+        </p:blipFill>
+        <p:spPr>
+          <a:xfrm>
+            <a:off x="6553991" y="2921648"/>
+            <a:ext cx="4683940" cy="669134"/>
           </a:xfrm>
           <a:prstGeom prst="rect">
             <a:avLst/>
@@ -9235,7 +9361,7 @@
     </p:spTree>
     <p:extLst>
       <p:ext uri="{BB962C8B-B14F-4D97-AF65-F5344CB8AC3E}">
-        <p14:creationId xmlns:p14="http://schemas.microsoft.com/office/powerpoint/2010/main" val="2889650564"/>
+        <p14:creationId xmlns:p14="http://schemas.microsoft.com/office/powerpoint/2010/main" val="677563142"/>
       </p:ext>
     </p:extLst>
   </p:cSld>
@@ -9272,7 +9398,7 @@
           <p:cNvPr id="2" name="Title 1">
             <a:extLst>
               <a:ext uri="{FF2B5EF4-FFF2-40B4-BE49-F238E27FC236}">
-                <a16:creationId xmlns:a16="http://schemas.microsoft.com/office/drawing/2014/main" id="{4E0CF6A0-3CBE-4149-1D7E-A40A8D1F7104}"/>
+                <a16:creationId xmlns:a16="http://schemas.microsoft.com/office/drawing/2014/main" id="{F9644F65-125B-4BB8-3554-FDE86799BAC5}"/>
               </a:ext>
             </a:extLst>
           </p:cNvPr>
@@ -9291,249 +9417,53 @@
           <a:lstStyle/>
           <a:p>
             <a:r>
-              <a:rPr lang="en-US" sz="3600" dirty="0"/>
-              <a:t>IRSBMF:DEDUCTIBILITY vs. Ours: </a:t>
-            </a:r>
-            <a:r>
-              <a:rPr lang="en-US" sz="3600" dirty="0" err="1"/>
-              <a:t>Donations_deductible</a:t>
-            </a:r>
-            <a:endParaRPr lang="en-US" sz="3600" dirty="0"/>
-          </a:p>
-        </p:txBody>
-      </p:sp>
-      <p:sp>
-        <p:nvSpPr>
-          <p:cNvPr id="20" name="TextBox 19">
-            <a:extLst>
-              <a:ext uri="{FF2B5EF4-FFF2-40B4-BE49-F238E27FC236}">
-                <a16:creationId xmlns:a16="http://schemas.microsoft.com/office/drawing/2014/main" id="{6E04F9D1-7E70-974C-0FB2-1A0F5C4DA787}"/>
-              </a:ext>
-            </a:extLst>
-          </p:cNvPr>
-          <p:cNvSpPr txBox="1"/>
-          <p:nvPr/>
-        </p:nvSpPr>
-        <p:spPr>
-          <a:xfrm>
-            <a:off x="617742" y="3608801"/>
-            <a:ext cx="3736279" cy="369332"/>
-          </a:xfrm>
-          <a:prstGeom prst="rect">
-            <a:avLst/>
-          </a:prstGeom>
-          <a:noFill/>
-        </p:spPr>
-        <p:txBody>
-          <a:bodyPr wrap="none" rtlCol="0">
-            <a:spAutoFit/>
-          </a:bodyPr>
-          <a:lstStyle/>
-          <a:p>
-            <a:r>
-              <a:rPr lang="en-US" dirty="0"/>
-              <a:t>Red box is where our codes </a:t>
-            </a:r>
-            <a:r>
-              <a:rPr lang="en-US" b="1" dirty="0"/>
-              <a:t>should</a:t>
-            </a:r>
-            <a:r>
-              <a:rPr lang="en-US" dirty="0"/>
-              <a:t> be</a:t>
-            </a:r>
-          </a:p>
-        </p:txBody>
-      </p:sp>
-      <p:sp>
-        <p:nvSpPr>
-          <p:cNvPr id="18" name="TextBox 17">
-            <a:extLst>
-              <a:ext uri="{FF2B5EF4-FFF2-40B4-BE49-F238E27FC236}">
-                <a16:creationId xmlns:a16="http://schemas.microsoft.com/office/drawing/2014/main" id="{72A16302-40D2-9A26-1E49-4368B8A87C75}"/>
-              </a:ext>
-            </a:extLst>
-          </p:cNvPr>
-          <p:cNvSpPr txBox="1"/>
-          <p:nvPr/>
-        </p:nvSpPr>
-        <p:spPr>
-          <a:xfrm>
-            <a:off x="4629336" y="3133446"/>
-            <a:ext cx="2017347" cy="369332"/>
-          </a:xfrm>
-          <a:prstGeom prst="rect">
-            <a:avLst/>
-          </a:prstGeom>
-          <a:noFill/>
-        </p:spPr>
-        <p:txBody>
-          <a:bodyPr wrap="none" rtlCol="0">
-            <a:spAutoFit/>
-          </a:bodyPr>
-          <a:lstStyle/>
-          <a:p>
-            <a:r>
-              <a:rPr lang="en-US" dirty="0"/>
-              <a:t>Filing Requirement:</a:t>
-            </a:r>
-          </a:p>
-        </p:txBody>
-      </p:sp>
-      <p:sp>
-        <p:nvSpPr>
-          <p:cNvPr id="27" name="TextBox 26">
-            <a:extLst>
-              <a:ext uri="{FF2B5EF4-FFF2-40B4-BE49-F238E27FC236}">
-                <a16:creationId xmlns:a16="http://schemas.microsoft.com/office/drawing/2014/main" id="{6E3D1FA3-444F-871D-C570-775D4A11E5C2}"/>
-              </a:ext>
-            </a:extLst>
-          </p:cNvPr>
-          <p:cNvSpPr txBox="1"/>
-          <p:nvPr/>
-        </p:nvSpPr>
-        <p:spPr>
-          <a:xfrm>
-            <a:off x="5614770" y="3877763"/>
-            <a:ext cx="849913" cy="369332"/>
-          </a:xfrm>
-          <a:prstGeom prst="rect">
-            <a:avLst/>
-          </a:prstGeom>
-          <a:noFill/>
-        </p:spPr>
-        <p:txBody>
-          <a:bodyPr wrap="none" rtlCol="0">
-            <a:spAutoFit/>
-          </a:bodyPr>
-          <a:lstStyle/>
-          <a:p>
-            <a:r>
-              <a:rPr lang="en-US" dirty="0"/>
-              <a:t>NTEE1:</a:t>
-            </a:r>
-          </a:p>
-        </p:txBody>
-      </p:sp>
-      <p:sp>
-        <p:nvSpPr>
-          <p:cNvPr id="32" name="TextBox 31">
-            <a:extLst>
-              <a:ext uri="{FF2B5EF4-FFF2-40B4-BE49-F238E27FC236}">
-                <a16:creationId xmlns:a16="http://schemas.microsoft.com/office/drawing/2014/main" id="{4E224EBF-770B-8D7E-AA59-9E4427D3F726}"/>
-              </a:ext>
-            </a:extLst>
-          </p:cNvPr>
-          <p:cNvSpPr txBox="1"/>
-          <p:nvPr/>
-        </p:nvSpPr>
-        <p:spPr>
-          <a:xfrm>
-            <a:off x="4680778" y="6080262"/>
-            <a:ext cx="1875385" cy="369332"/>
-          </a:xfrm>
-          <a:prstGeom prst="rect">
-            <a:avLst/>
-          </a:prstGeom>
-          <a:noFill/>
-        </p:spPr>
-        <p:txBody>
-          <a:bodyPr wrap="none" rtlCol="0">
-            <a:spAutoFit/>
-          </a:bodyPr>
-          <a:lstStyle/>
-          <a:p>
-            <a:r>
-              <a:rPr lang="en-US" dirty="0" err="1"/>
-              <a:t>Govt_established</a:t>
-            </a:r>
-            <a:r>
-              <a:rPr lang="en-US" dirty="0"/>
-              <a:t>:</a:t>
-            </a:r>
-          </a:p>
-        </p:txBody>
-      </p:sp>
-      <p:sp>
-        <p:nvSpPr>
-          <p:cNvPr id="35" name="TextBox 34">
-            <a:extLst>
-              <a:ext uri="{FF2B5EF4-FFF2-40B4-BE49-F238E27FC236}">
-                <a16:creationId xmlns:a16="http://schemas.microsoft.com/office/drawing/2014/main" id="{61BDC008-7BF7-024F-06EF-9E3F58E5D51B}"/>
-              </a:ext>
-            </a:extLst>
-          </p:cNvPr>
-          <p:cNvSpPr txBox="1"/>
-          <p:nvPr/>
-        </p:nvSpPr>
-        <p:spPr>
-          <a:xfrm>
-            <a:off x="5582587" y="2464244"/>
-            <a:ext cx="1436675" cy="369332"/>
-          </a:xfrm>
-          <a:prstGeom prst="rect">
-            <a:avLst/>
-          </a:prstGeom>
-          <a:noFill/>
-        </p:spPr>
-        <p:txBody>
-          <a:bodyPr wrap="none" rtlCol="0">
-            <a:spAutoFit/>
-          </a:bodyPr>
-          <a:lstStyle/>
-          <a:p>
-            <a:r>
-              <a:rPr lang="en-US" dirty="0"/>
-              <a:t>SUBSECTION:</a:t>
-            </a:r>
-          </a:p>
-        </p:txBody>
-      </p:sp>
-      <p:sp>
-        <p:nvSpPr>
-          <p:cNvPr id="37" name="TextBox 36">
-            <a:extLst>
-              <a:ext uri="{FF2B5EF4-FFF2-40B4-BE49-F238E27FC236}">
-                <a16:creationId xmlns:a16="http://schemas.microsoft.com/office/drawing/2014/main" id="{60BAD4C9-EB91-AF45-2A51-70F43A2F017E}"/>
-              </a:ext>
-            </a:extLst>
-          </p:cNvPr>
-          <p:cNvSpPr txBox="1"/>
-          <p:nvPr/>
-        </p:nvSpPr>
-        <p:spPr>
-          <a:xfrm>
-            <a:off x="4157132" y="5268643"/>
-            <a:ext cx="2367186" cy="369332"/>
-          </a:xfrm>
-          <a:prstGeom prst="rect">
-            <a:avLst/>
-          </a:prstGeom>
-          <a:noFill/>
-        </p:spPr>
-        <p:txBody>
-          <a:bodyPr wrap="none" rtlCol="0">
-            <a:spAutoFit/>
-          </a:bodyPr>
-          <a:lstStyle/>
-          <a:p>
-            <a:r>
-              <a:rPr lang="en-US" dirty="0" err="1"/>
-              <a:t>Tax_exempt_subgroup</a:t>
-            </a:r>
-            <a:r>
-              <a:rPr lang="en-US" dirty="0"/>
-              <a:t>:</a:t>
-            </a:r>
+              <a:rPr lang="en-US" sz="4200" dirty="0"/>
+              <a:t>IRSBMF: FOUNDATION vs. Our </a:t>
+            </a:r>
+            <a:r>
+              <a:rPr lang="en-US" sz="4200" dirty="0" err="1"/>
+              <a:t>Govt_Established</a:t>
+            </a:r>
+            <a:endParaRPr lang="en-US" sz="4200" dirty="0"/>
           </a:p>
         </p:txBody>
       </p:sp>
       <p:pic>
         <p:nvPicPr>
-          <p:cNvPr id="15" name="Picture 14" descr="A number and number on a white background&#10;&#10;Description automatically generated">
-            <a:extLst>
-              <a:ext uri="{FF2B5EF4-FFF2-40B4-BE49-F238E27FC236}">
-                <a16:creationId xmlns:a16="http://schemas.microsoft.com/office/drawing/2014/main" id="{50688457-DBBF-DD3B-8B28-1671A0CE0CFB}"/>
+          <p:cNvPr id="5" name="Picture 4" descr="A number in a row&#10;&#10;Description automatically generated with medium confidence">
+            <a:extLst>
+              <a:ext uri="{FF2B5EF4-FFF2-40B4-BE49-F238E27FC236}">
+                <a16:creationId xmlns:a16="http://schemas.microsoft.com/office/drawing/2014/main" id="{32CAA092-8724-D143-2CF9-17B566F1FCF3}"/>
+              </a:ext>
+            </a:extLst>
+          </p:cNvPr>
+          <p:cNvPicPr>
+            <a:picLocks noChangeAspect="1"/>
+          </p:cNvPicPr>
+          <p:nvPr/>
+        </p:nvPicPr>
+        <p:blipFill>
+          <a:blip r:embed="rId2"/>
+          <a:stretch>
+            <a:fillRect/>
+          </a:stretch>
+        </p:blipFill>
+        <p:spPr>
+          <a:xfrm>
+            <a:off x="496058" y="1569990"/>
+            <a:ext cx="2418433" cy="5059362"/>
+          </a:xfrm>
+          <a:prstGeom prst="rect">
+            <a:avLst/>
+          </a:prstGeom>
+        </p:spPr>
+      </p:pic>
+      <p:pic>
+        <p:nvPicPr>
+          <p:cNvPr id="7" name="Picture 6">
+            <a:extLst>
+              <a:ext uri="{FF2B5EF4-FFF2-40B4-BE49-F238E27FC236}">
+                <a16:creationId xmlns:a16="http://schemas.microsoft.com/office/drawing/2014/main" id="{1C9FDDB9-51C7-A46B-E7C9-57FDA641F392}"/>
               </a:ext>
             </a:extLst>
           </p:cNvPr>
@@ -9550,417 +9480,20 @@
         </p:blipFill>
         <p:spPr>
           <a:xfrm>
-            <a:off x="237312" y="1766933"/>
-            <a:ext cx="4152900" cy="1676400"/>
+            <a:off x="241300" y="1208088"/>
+            <a:ext cx="6223000" cy="482600"/>
           </a:xfrm>
           <a:prstGeom prst="rect">
             <a:avLst/>
           </a:prstGeom>
         </p:spPr>
       </p:pic>
-      <p:sp>
-        <p:nvSpPr>
-          <p:cNvPr id="16" name="TextBox 15">
-            <a:extLst>
-              <a:ext uri="{FF2B5EF4-FFF2-40B4-BE49-F238E27FC236}">
-                <a16:creationId xmlns:a16="http://schemas.microsoft.com/office/drawing/2014/main" id="{43F8CB51-3AA3-77E5-F88F-E2A9D8C680C9}"/>
-              </a:ext>
-            </a:extLst>
-          </p:cNvPr>
-          <p:cNvSpPr txBox="1"/>
-          <p:nvPr/>
-        </p:nvSpPr>
-        <p:spPr>
-          <a:xfrm>
-            <a:off x="617742" y="3608801"/>
-            <a:ext cx="3736279" cy="369332"/>
-          </a:xfrm>
-          <a:prstGeom prst="rect">
-            <a:avLst/>
-          </a:prstGeom>
-          <a:noFill/>
-        </p:spPr>
-        <p:txBody>
-          <a:bodyPr wrap="none" rtlCol="0">
-            <a:spAutoFit/>
-          </a:bodyPr>
-          <a:lstStyle/>
-          <a:p>
-            <a:r>
-              <a:rPr lang="en-US" dirty="0"/>
-              <a:t>Red box is where our codes </a:t>
-            </a:r>
-            <a:r>
-              <a:rPr lang="en-US" b="1" dirty="0"/>
-              <a:t>should</a:t>
-            </a:r>
-            <a:r>
-              <a:rPr lang="en-US" dirty="0"/>
-              <a:t> be</a:t>
-            </a:r>
-          </a:p>
-        </p:txBody>
-      </p:sp>
-      <p:sp>
-        <p:nvSpPr>
-          <p:cNvPr id="17" name="Rectangle 16">
-            <a:extLst>
-              <a:ext uri="{FF2B5EF4-FFF2-40B4-BE49-F238E27FC236}">
-                <a16:creationId xmlns:a16="http://schemas.microsoft.com/office/drawing/2014/main" id="{92CD9287-0D65-6FE1-7BA1-F0C8B17FCFD4}"/>
-              </a:ext>
-            </a:extLst>
-          </p:cNvPr>
-          <p:cNvSpPr/>
-          <p:nvPr/>
-        </p:nvSpPr>
-        <p:spPr>
-          <a:xfrm>
-            <a:off x="2677731" y="2589244"/>
-            <a:ext cx="720561" cy="184666"/>
-          </a:xfrm>
-          <a:prstGeom prst="rect">
-            <a:avLst/>
-          </a:prstGeom>
-          <a:noFill/>
-          <a:ln w="19050">
-            <a:solidFill>
-              <a:srgbClr val="FF0000"/>
-            </a:solidFill>
-          </a:ln>
-        </p:spPr>
-        <p:style>
-          <a:lnRef idx="2">
-            <a:schemeClr val="accent1">
-              <a:shade val="15000"/>
-            </a:schemeClr>
-          </a:lnRef>
-          <a:fillRef idx="1">
-            <a:schemeClr val="accent1"/>
-          </a:fillRef>
-          <a:effectRef idx="0">
-            <a:schemeClr val="accent1"/>
-          </a:effectRef>
-          <a:fontRef idx="minor">
-            <a:schemeClr val="lt1"/>
-          </a:fontRef>
-        </p:style>
-        <p:txBody>
-          <a:bodyPr rtlCol="0" anchor="ctr"/>
-          <a:lstStyle/>
-          <a:p>
-            <a:pPr algn="ctr"/>
-            <a:endParaRPr lang="en-US"/>
-          </a:p>
-        </p:txBody>
-      </p:sp>
-      <p:sp>
-        <p:nvSpPr>
-          <p:cNvPr id="19" name="Rectangle 18">
-            <a:extLst>
-              <a:ext uri="{FF2B5EF4-FFF2-40B4-BE49-F238E27FC236}">
-                <a16:creationId xmlns:a16="http://schemas.microsoft.com/office/drawing/2014/main" id="{FBF38442-8E7E-D6DE-226D-452A5ED66539}"/>
-              </a:ext>
-            </a:extLst>
-          </p:cNvPr>
-          <p:cNvSpPr/>
-          <p:nvPr/>
-        </p:nvSpPr>
-        <p:spPr>
-          <a:xfrm>
-            <a:off x="3425587" y="2594932"/>
-            <a:ext cx="928434" cy="178978"/>
-          </a:xfrm>
-          <a:prstGeom prst="rect">
-            <a:avLst/>
-          </a:prstGeom>
-          <a:noFill/>
-          <a:ln w="19050">
-            <a:solidFill>
-              <a:srgbClr val="FF0000"/>
-            </a:solidFill>
-          </a:ln>
-        </p:spPr>
-        <p:style>
-          <a:lnRef idx="2">
-            <a:schemeClr val="accent1">
-              <a:shade val="15000"/>
-            </a:schemeClr>
-          </a:lnRef>
-          <a:fillRef idx="1">
-            <a:schemeClr val="accent1"/>
-          </a:fillRef>
-          <a:effectRef idx="0">
-            <a:schemeClr val="accent1"/>
-          </a:effectRef>
-          <a:fontRef idx="minor">
-            <a:schemeClr val="lt1"/>
-          </a:fontRef>
-        </p:style>
-        <p:txBody>
-          <a:bodyPr rtlCol="0" anchor="ctr"/>
-          <a:lstStyle/>
-          <a:p>
-            <a:pPr algn="ctr"/>
-            <a:endParaRPr lang="en-US"/>
-          </a:p>
-        </p:txBody>
-      </p:sp>
-      <p:sp>
-        <p:nvSpPr>
-          <p:cNvPr id="26" name="Rectangle 25">
-            <a:extLst>
-              <a:ext uri="{FF2B5EF4-FFF2-40B4-BE49-F238E27FC236}">
-                <a16:creationId xmlns:a16="http://schemas.microsoft.com/office/drawing/2014/main" id="{6A3DA263-DCF7-7FEA-A9B8-9FBF9D49ADFB}"/>
-              </a:ext>
-            </a:extLst>
-          </p:cNvPr>
-          <p:cNvSpPr/>
-          <p:nvPr/>
-        </p:nvSpPr>
-        <p:spPr>
-          <a:xfrm>
-            <a:off x="1570598" y="2892917"/>
-            <a:ext cx="928434" cy="178978"/>
-          </a:xfrm>
-          <a:prstGeom prst="rect">
-            <a:avLst/>
-          </a:prstGeom>
-          <a:noFill/>
-          <a:ln w="19050">
-            <a:solidFill>
-              <a:srgbClr val="FF0000"/>
-            </a:solidFill>
-          </a:ln>
-        </p:spPr>
-        <p:style>
-          <a:lnRef idx="2">
-            <a:schemeClr val="accent1">
-              <a:shade val="15000"/>
-            </a:schemeClr>
-          </a:lnRef>
-          <a:fillRef idx="1">
-            <a:schemeClr val="accent1"/>
-          </a:fillRef>
-          <a:effectRef idx="0">
-            <a:schemeClr val="accent1"/>
-          </a:effectRef>
-          <a:fontRef idx="minor">
-            <a:schemeClr val="lt1"/>
-          </a:fontRef>
-        </p:style>
-        <p:txBody>
-          <a:bodyPr rtlCol="0" anchor="ctr"/>
-          <a:lstStyle/>
-          <a:p>
-            <a:pPr algn="ctr"/>
-            <a:endParaRPr lang="en-US"/>
-          </a:p>
-        </p:txBody>
-      </p:sp>
-      <p:sp>
-        <p:nvSpPr>
-          <p:cNvPr id="28" name="Rectangle 27">
-            <a:extLst>
-              <a:ext uri="{FF2B5EF4-FFF2-40B4-BE49-F238E27FC236}">
-                <a16:creationId xmlns:a16="http://schemas.microsoft.com/office/drawing/2014/main" id="{8C203894-4123-7502-37E3-CBDDD0117F01}"/>
-              </a:ext>
-            </a:extLst>
-          </p:cNvPr>
-          <p:cNvSpPr/>
-          <p:nvPr/>
-        </p:nvSpPr>
-        <p:spPr>
-          <a:xfrm>
-            <a:off x="2691115" y="3148050"/>
-            <a:ext cx="734472" cy="178978"/>
-          </a:xfrm>
-          <a:prstGeom prst="rect">
-            <a:avLst/>
-          </a:prstGeom>
-          <a:noFill/>
-          <a:ln w="19050">
-            <a:solidFill>
-              <a:srgbClr val="FF0000"/>
-            </a:solidFill>
-          </a:ln>
-        </p:spPr>
-        <p:style>
-          <a:lnRef idx="2">
-            <a:schemeClr val="accent1">
-              <a:shade val="15000"/>
-            </a:schemeClr>
-          </a:lnRef>
-          <a:fillRef idx="1">
-            <a:schemeClr val="accent1"/>
-          </a:fillRef>
-          <a:effectRef idx="0">
-            <a:schemeClr val="accent1"/>
-          </a:effectRef>
-          <a:fontRef idx="minor">
-            <a:schemeClr val="lt1"/>
-          </a:fontRef>
-        </p:style>
-        <p:txBody>
-          <a:bodyPr rtlCol="0" anchor="ctr"/>
-          <a:lstStyle/>
-          <a:p>
-            <a:pPr algn="ctr"/>
-            <a:endParaRPr lang="en-US"/>
-          </a:p>
-        </p:txBody>
-      </p:sp>
-      <p:sp>
-        <p:nvSpPr>
-          <p:cNvPr id="30" name="Rectangle 29">
-            <a:extLst>
-              <a:ext uri="{FF2B5EF4-FFF2-40B4-BE49-F238E27FC236}">
-                <a16:creationId xmlns:a16="http://schemas.microsoft.com/office/drawing/2014/main" id="{6A069445-8B2D-0519-CDF3-5BFB45848C8C}"/>
-              </a:ext>
-            </a:extLst>
-          </p:cNvPr>
-          <p:cNvSpPr/>
-          <p:nvPr/>
-        </p:nvSpPr>
-        <p:spPr>
-          <a:xfrm>
-            <a:off x="3522568" y="3136190"/>
-            <a:ext cx="734472" cy="178978"/>
-          </a:xfrm>
-          <a:prstGeom prst="rect">
-            <a:avLst/>
-          </a:prstGeom>
-          <a:noFill/>
-          <a:ln w="19050">
-            <a:solidFill>
-              <a:srgbClr val="FF0000"/>
-            </a:solidFill>
-          </a:ln>
-        </p:spPr>
-        <p:style>
-          <a:lnRef idx="2">
-            <a:schemeClr val="accent1">
-              <a:shade val="15000"/>
-            </a:schemeClr>
-          </a:lnRef>
-          <a:fillRef idx="1">
-            <a:schemeClr val="accent1"/>
-          </a:fillRef>
-          <a:effectRef idx="0">
-            <a:schemeClr val="accent1"/>
-          </a:effectRef>
-          <a:fontRef idx="minor">
-            <a:schemeClr val="lt1"/>
-          </a:fontRef>
-        </p:style>
-        <p:txBody>
-          <a:bodyPr rtlCol="0" anchor="ctr"/>
-          <a:lstStyle/>
-          <a:p>
-            <a:pPr algn="ctr"/>
-            <a:endParaRPr lang="en-US"/>
-          </a:p>
-        </p:txBody>
-      </p:sp>
-      <p:sp>
-        <p:nvSpPr>
-          <p:cNvPr id="31" name="Oval 30">
-            <a:extLst>
-              <a:ext uri="{FF2B5EF4-FFF2-40B4-BE49-F238E27FC236}">
-                <a16:creationId xmlns:a16="http://schemas.microsoft.com/office/drawing/2014/main" id="{9B5AA43F-72FD-22FB-BC23-C5A6FD749D75}"/>
-              </a:ext>
-            </a:extLst>
-          </p:cNvPr>
-          <p:cNvSpPr/>
-          <p:nvPr/>
-        </p:nvSpPr>
-        <p:spPr>
-          <a:xfrm>
-            <a:off x="2625008" y="2701096"/>
-            <a:ext cx="1970549" cy="569842"/>
-          </a:xfrm>
-          <a:prstGeom prst="ellipse">
-            <a:avLst/>
-          </a:prstGeom>
-          <a:noFill/>
-          <a:ln w="28575">
-            <a:solidFill>
-              <a:schemeClr val="accent1"/>
-            </a:solidFill>
-          </a:ln>
-        </p:spPr>
-        <p:style>
-          <a:lnRef idx="2">
-            <a:schemeClr val="accent1">
-              <a:shade val="15000"/>
-            </a:schemeClr>
-          </a:lnRef>
-          <a:fillRef idx="1">
-            <a:schemeClr val="accent1"/>
-          </a:fillRef>
-          <a:effectRef idx="0">
-            <a:schemeClr val="accent1"/>
-          </a:effectRef>
-          <a:fontRef idx="minor">
-            <a:schemeClr val="lt1"/>
-          </a:fontRef>
-        </p:style>
-        <p:txBody>
-          <a:bodyPr rtlCol="0" anchor="ctr"/>
-          <a:lstStyle/>
-          <a:p>
-            <a:pPr algn="ctr"/>
-            <a:endParaRPr lang="en-US"/>
-          </a:p>
-        </p:txBody>
-      </p:sp>
-      <p:cxnSp>
-        <p:nvCxnSpPr>
-          <p:cNvPr id="34" name="Straight Arrow Connector 33">
-            <a:extLst>
-              <a:ext uri="{FF2B5EF4-FFF2-40B4-BE49-F238E27FC236}">
-                <a16:creationId xmlns:a16="http://schemas.microsoft.com/office/drawing/2014/main" id="{04883DA6-2512-9801-B0DB-67709843B96C}"/>
-              </a:ext>
-            </a:extLst>
-          </p:cNvPr>
-          <p:cNvCxnSpPr>
-            <a:cxnSpLocks/>
-            <a:stCxn id="31" idx="6"/>
-          </p:cNvCxnSpPr>
-          <p:nvPr/>
-        </p:nvCxnSpPr>
-        <p:spPr>
-          <a:xfrm flipV="1">
-            <a:off x="4595557" y="2589244"/>
-            <a:ext cx="781684" cy="396773"/>
-          </a:xfrm>
-          <a:prstGeom prst="straightConnector1">
-            <a:avLst/>
-          </a:prstGeom>
-          <a:ln>
-            <a:tailEnd type="triangle"/>
-          </a:ln>
-        </p:spPr>
-        <p:style>
-          <a:lnRef idx="1">
-            <a:schemeClr val="accent1"/>
-          </a:lnRef>
-          <a:fillRef idx="0">
-            <a:schemeClr val="accent1"/>
-          </a:fillRef>
-          <a:effectRef idx="0">
-            <a:schemeClr val="accent1"/>
-          </a:effectRef>
-          <a:fontRef idx="minor">
-            <a:schemeClr val="tx1"/>
-          </a:fontRef>
-        </p:style>
-      </p:cxnSp>
       <p:pic>
         <p:nvPicPr>
-          <p:cNvPr id="40" name="Picture 39">
-            <a:extLst>
-              <a:ext uri="{FF2B5EF4-FFF2-40B4-BE49-F238E27FC236}">
-                <a16:creationId xmlns:a16="http://schemas.microsoft.com/office/drawing/2014/main" id="{F3FBE280-BD68-A3E9-4C7F-F69A70A1BD6F}"/>
+          <p:cNvPr id="10" name="Picture 9" descr="A close-up of numbers&#10;&#10;Description automatically generated">
+            <a:extLst>
+              <a:ext uri="{FF2B5EF4-FFF2-40B4-BE49-F238E27FC236}">
+                <a16:creationId xmlns:a16="http://schemas.microsoft.com/office/drawing/2014/main" id="{4AD8B92C-C411-0FD2-4EB9-381707A25089}"/>
               </a:ext>
             </a:extLst>
           </p:cNvPr>
@@ -9977,50 +9510,20 @@
         </p:blipFill>
         <p:spPr>
           <a:xfrm>
-            <a:off x="0" y="1612082"/>
-            <a:ext cx="5871357" cy="478022"/>
+            <a:off x="6652999" y="2184400"/>
+            <a:ext cx="3771900" cy="1244600"/>
           </a:xfrm>
           <a:prstGeom prst="rect">
             <a:avLst/>
           </a:prstGeom>
         </p:spPr>
       </p:pic>
-      <p:pic>
-        <p:nvPicPr>
-          <p:cNvPr id="47" name="Picture 46" descr="A number with numbers on it&#10;&#10;Description automatically generated with medium confidence">
-            <a:extLst>
-              <a:ext uri="{FF2B5EF4-FFF2-40B4-BE49-F238E27FC236}">
-                <a16:creationId xmlns:a16="http://schemas.microsoft.com/office/drawing/2014/main" id="{60142687-7143-E808-5B65-E55E1DF11D8A}"/>
-              </a:ext>
-            </a:extLst>
-          </p:cNvPr>
-          <p:cNvPicPr>
-            <a:picLocks noChangeAspect="1"/>
-          </p:cNvPicPr>
-          <p:nvPr/>
-        </p:nvPicPr>
-        <p:blipFill>
-          <a:blip r:embed="rId5"/>
-          <a:stretch>
-            <a:fillRect/>
-          </a:stretch>
-        </p:blipFill>
-        <p:spPr>
-          <a:xfrm>
-            <a:off x="6928521" y="2340388"/>
-            <a:ext cx="3987800" cy="749300"/>
-          </a:xfrm>
-          <a:prstGeom prst="rect">
-            <a:avLst/>
-          </a:prstGeom>
-        </p:spPr>
-      </p:pic>
-      <p:sp>
-        <p:nvSpPr>
-          <p:cNvPr id="48" name="TextBox 47">
-            <a:extLst>
-              <a:ext uri="{FF2B5EF4-FFF2-40B4-BE49-F238E27FC236}">
-                <a16:creationId xmlns:a16="http://schemas.microsoft.com/office/drawing/2014/main" id="{A7A4CCB8-CC7C-332F-F031-322BE9B259E1}"/>
+      <p:sp>
+        <p:nvSpPr>
+          <p:cNvPr id="11" name="TextBox 10">
+            <a:extLst>
+              <a:ext uri="{FF2B5EF4-FFF2-40B4-BE49-F238E27FC236}">
+                <a16:creationId xmlns:a16="http://schemas.microsoft.com/office/drawing/2014/main" id="{CCD56790-9D0A-C6F7-F3B0-0DDFAAF08100}"/>
               </a:ext>
             </a:extLst>
           </p:cNvPr>
@@ -10029,192 +9532,37 @@
         </p:nvSpPr>
         <p:spPr>
           <a:xfrm>
-            <a:off x="8666921" y="6123543"/>
-            <a:ext cx="1218603" cy="369332"/>
-          </a:xfrm>
-          <a:prstGeom prst="rect">
-            <a:avLst/>
-          </a:prstGeom>
-          <a:noFill/>
-        </p:spPr>
-        <p:txBody>
-          <a:bodyPr wrap="none" rtlCol="0">
+            <a:off x="6748535" y="1668739"/>
+            <a:ext cx="3883072" cy="646331"/>
+          </a:xfrm>
+          <a:prstGeom prst="rect">
+            <a:avLst/>
+          </a:prstGeom>
+          <a:noFill/>
+        </p:spPr>
+        <p:txBody>
+          <a:bodyPr wrap="square" rtlCol="0">
             <a:spAutoFit/>
           </a:bodyPr>
           <a:lstStyle/>
           <a:p>
             <a:r>
               <a:rPr lang="en-US" dirty="0"/>
-              <a:t>Supporting</a:t>
-            </a:r>
-          </a:p>
-        </p:txBody>
-      </p:sp>
-      <p:pic>
-        <p:nvPicPr>
-          <p:cNvPr id="50" name="Picture 49" descr="A close-up of numbers&#10;&#10;Description automatically generated">
-            <a:extLst>
-              <a:ext uri="{FF2B5EF4-FFF2-40B4-BE49-F238E27FC236}">
-                <a16:creationId xmlns:a16="http://schemas.microsoft.com/office/drawing/2014/main" id="{AF448DCD-3F64-AB92-EACC-DA193BF96314}"/>
-              </a:ext>
-            </a:extLst>
-          </p:cNvPr>
-          <p:cNvPicPr>
-            <a:picLocks noChangeAspect="1"/>
-          </p:cNvPicPr>
-          <p:nvPr/>
-        </p:nvPicPr>
-        <p:blipFill>
-          <a:blip r:embed="rId6"/>
-          <a:stretch>
-            <a:fillRect/>
-          </a:stretch>
-        </p:blipFill>
-        <p:spPr>
-          <a:xfrm>
-            <a:off x="9885524" y="5927209"/>
-            <a:ext cx="1295400" cy="762000"/>
-          </a:xfrm>
-          <a:prstGeom prst="rect">
-            <a:avLst/>
-          </a:prstGeom>
-        </p:spPr>
-      </p:pic>
-      <p:pic>
-        <p:nvPicPr>
-          <p:cNvPr id="52" name="Picture 51" descr="A black text with black letters&#10;&#10;Description automatically generated">
-            <a:extLst>
-              <a:ext uri="{FF2B5EF4-FFF2-40B4-BE49-F238E27FC236}">
-                <a16:creationId xmlns:a16="http://schemas.microsoft.com/office/drawing/2014/main" id="{3CAB4900-7994-411D-0F79-412463FC45E1}"/>
-              </a:ext>
-            </a:extLst>
-          </p:cNvPr>
-          <p:cNvPicPr>
-            <a:picLocks noChangeAspect="1"/>
-          </p:cNvPicPr>
-          <p:nvPr/>
-        </p:nvPicPr>
-        <p:blipFill>
-          <a:blip r:embed="rId7"/>
-          <a:stretch>
-            <a:fillRect/>
-          </a:stretch>
-        </p:blipFill>
-        <p:spPr>
-          <a:xfrm>
-            <a:off x="6464683" y="5896495"/>
-            <a:ext cx="1752600" cy="673100"/>
-          </a:xfrm>
-          <a:prstGeom prst="rect">
-            <a:avLst/>
-          </a:prstGeom>
-        </p:spPr>
-      </p:pic>
-      <p:pic>
-        <p:nvPicPr>
-          <p:cNvPr id="54" name="Picture 53" descr="A close up of numbers&#10;&#10;Description automatically generated">
-            <a:extLst>
-              <a:ext uri="{FF2B5EF4-FFF2-40B4-BE49-F238E27FC236}">
-                <a16:creationId xmlns:a16="http://schemas.microsoft.com/office/drawing/2014/main" id="{C35C9A28-6CCC-27FC-24C8-D0FF0F6F6C2A}"/>
-              </a:ext>
-            </a:extLst>
-          </p:cNvPr>
-          <p:cNvPicPr>
-            <a:picLocks noChangeAspect="1"/>
-          </p:cNvPicPr>
-          <p:nvPr/>
-        </p:nvPicPr>
-        <p:blipFill>
-          <a:blip r:embed="rId8"/>
-          <a:stretch>
-            <a:fillRect/>
-          </a:stretch>
-        </p:blipFill>
-        <p:spPr>
-          <a:xfrm>
-            <a:off x="6556163" y="5164801"/>
-            <a:ext cx="2641600" cy="635000"/>
-          </a:xfrm>
-          <a:prstGeom prst="rect">
-            <a:avLst/>
-          </a:prstGeom>
-        </p:spPr>
-      </p:pic>
-      <p:pic>
-        <p:nvPicPr>
-          <p:cNvPr id="56" name="Picture 55" descr="A close-up of numbers&#10;&#10;Description automatically generated">
-            <a:extLst>
-              <a:ext uri="{FF2B5EF4-FFF2-40B4-BE49-F238E27FC236}">
-                <a16:creationId xmlns:a16="http://schemas.microsoft.com/office/drawing/2014/main" id="{0331116C-445E-74E9-84BD-0DE1E08CE2B1}"/>
-              </a:ext>
-            </a:extLst>
-          </p:cNvPr>
-          <p:cNvPicPr>
-            <a:picLocks noChangeAspect="1"/>
-          </p:cNvPicPr>
-          <p:nvPr/>
-        </p:nvPicPr>
-        <p:blipFill>
-          <a:blip r:embed="rId9"/>
-          <a:stretch>
-            <a:fillRect/>
-          </a:stretch>
-        </p:blipFill>
-        <p:spPr>
-          <a:xfrm>
-            <a:off x="6524318" y="3863244"/>
-            <a:ext cx="4552950" cy="666750"/>
-          </a:xfrm>
-          <a:prstGeom prst="rect">
-            <a:avLst/>
-          </a:prstGeom>
-        </p:spPr>
-      </p:pic>
-      <p:pic>
-        <p:nvPicPr>
-          <p:cNvPr id="58" name="Picture 57" descr="A number and a number&#10;&#10;Description automatically generated with medium confidence">
-            <a:extLst>
-              <a:ext uri="{FF2B5EF4-FFF2-40B4-BE49-F238E27FC236}">
-                <a16:creationId xmlns:a16="http://schemas.microsoft.com/office/drawing/2014/main" id="{91B9693A-5597-92A1-EE72-B1D3ABDAC75F}"/>
-              </a:ext>
-            </a:extLst>
-          </p:cNvPr>
-          <p:cNvPicPr>
-            <a:picLocks noChangeAspect="1"/>
-          </p:cNvPicPr>
-          <p:nvPr/>
-        </p:nvPicPr>
-        <p:blipFill>
-          <a:blip r:embed="rId10"/>
-          <a:stretch>
-            <a:fillRect/>
-          </a:stretch>
-        </p:blipFill>
-        <p:spPr>
-          <a:xfrm>
-            <a:off x="6553991" y="2921648"/>
-            <a:ext cx="4683940" cy="669134"/>
-          </a:xfrm>
-          <a:prstGeom prst="rect">
-            <a:avLst/>
-          </a:prstGeom>
-        </p:spPr>
-      </p:pic>
+              <a:t>This is good. All federally established organizations are non-501c3s</a:t>
+            </a:r>
+          </a:p>
+        </p:txBody>
+      </p:sp>
     </p:spTree>
     <p:extLst>
       <p:ext uri="{BB962C8B-B14F-4D97-AF65-F5344CB8AC3E}">
-        <p14:creationId xmlns:p14="http://schemas.microsoft.com/office/powerpoint/2010/main" val="677563142"/>
+        <p14:creationId xmlns:p14="http://schemas.microsoft.com/office/powerpoint/2010/main" val="1267954565"/>
       </p:ext>
     </p:extLst>
   </p:cSld>
   <p:clrMapOvr>
     <a:masterClrMapping/>
   </p:clrMapOvr>
-  <p:extLst>
-    <p:ext uri="{6950BFC3-D8DA-4A85-94F7-54DA5524770B}">
-      <p188:commentRel xmlns:p188="http://schemas.microsoft.com/office/powerpoint/2018/8/main" r:id="rId2"/>
-    </p:ext>
-  </p:extLst>
 </p:sld>
 </file>
 
@@ -10240,196 +9588,6 @@
           <p:cNvPr id="2" name="Title 1">
             <a:extLst>
               <a:ext uri="{FF2B5EF4-FFF2-40B4-BE49-F238E27FC236}">
-                <a16:creationId xmlns:a16="http://schemas.microsoft.com/office/drawing/2014/main" id="{F9644F65-125B-4BB8-3554-FDE86799BAC5}"/>
-              </a:ext>
-            </a:extLst>
-          </p:cNvPr>
-          <p:cNvSpPr>
-            <a:spLocks noGrp="1"/>
-          </p:cNvSpPr>
-          <p:nvPr>
-            <p:ph type="title"/>
-          </p:nvPr>
-        </p:nvSpPr>
-        <p:spPr/>
-        <p:txBody>
-          <a:bodyPr>
-            <a:normAutofit/>
-          </a:bodyPr>
-          <a:lstStyle/>
-          <a:p>
-            <a:r>
-              <a:rPr lang="en-US" sz="4200" dirty="0"/>
-              <a:t>IRSBMF: FOUNDATION vs. Our </a:t>
-            </a:r>
-            <a:r>
-              <a:rPr lang="en-US" sz="4200" dirty="0" err="1"/>
-              <a:t>Govt_Established</a:t>
-            </a:r>
-            <a:endParaRPr lang="en-US" sz="4200" dirty="0"/>
-          </a:p>
-        </p:txBody>
-      </p:sp>
-      <p:pic>
-        <p:nvPicPr>
-          <p:cNvPr id="5" name="Picture 4" descr="A number in a row&#10;&#10;Description automatically generated with medium confidence">
-            <a:extLst>
-              <a:ext uri="{FF2B5EF4-FFF2-40B4-BE49-F238E27FC236}">
-                <a16:creationId xmlns:a16="http://schemas.microsoft.com/office/drawing/2014/main" id="{32CAA092-8724-D143-2CF9-17B566F1FCF3}"/>
-              </a:ext>
-            </a:extLst>
-          </p:cNvPr>
-          <p:cNvPicPr>
-            <a:picLocks noChangeAspect="1"/>
-          </p:cNvPicPr>
-          <p:nvPr/>
-        </p:nvPicPr>
-        <p:blipFill>
-          <a:blip r:embed="rId2"/>
-          <a:stretch>
-            <a:fillRect/>
-          </a:stretch>
-        </p:blipFill>
-        <p:spPr>
-          <a:xfrm>
-            <a:off x="496058" y="1569990"/>
-            <a:ext cx="2418433" cy="5059362"/>
-          </a:xfrm>
-          <a:prstGeom prst="rect">
-            <a:avLst/>
-          </a:prstGeom>
-        </p:spPr>
-      </p:pic>
-      <p:pic>
-        <p:nvPicPr>
-          <p:cNvPr id="7" name="Picture 6">
-            <a:extLst>
-              <a:ext uri="{FF2B5EF4-FFF2-40B4-BE49-F238E27FC236}">
-                <a16:creationId xmlns:a16="http://schemas.microsoft.com/office/drawing/2014/main" id="{1C9FDDB9-51C7-A46B-E7C9-57FDA641F392}"/>
-              </a:ext>
-            </a:extLst>
-          </p:cNvPr>
-          <p:cNvPicPr>
-            <a:picLocks noChangeAspect="1"/>
-          </p:cNvPicPr>
-          <p:nvPr/>
-        </p:nvPicPr>
-        <p:blipFill>
-          <a:blip r:embed="rId3"/>
-          <a:stretch>
-            <a:fillRect/>
-          </a:stretch>
-        </p:blipFill>
-        <p:spPr>
-          <a:xfrm>
-            <a:off x="241300" y="1208088"/>
-            <a:ext cx="6223000" cy="482600"/>
-          </a:xfrm>
-          <a:prstGeom prst="rect">
-            <a:avLst/>
-          </a:prstGeom>
-        </p:spPr>
-      </p:pic>
-      <p:pic>
-        <p:nvPicPr>
-          <p:cNvPr id="10" name="Picture 9" descr="A close-up of numbers&#10;&#10;Description automatically generated">
-            <a:extLst>
-              <a:ext uri="{FF2B5EF4-FFF2-40B4-BE49-F238E27FC236}">
-                <a16:creationId xmlns:a16="http://schemas.microsoft.com/office/drawing/2014/main" id="{4AD8B92C-C411-0FD2-4EB9-381707A25089}"/>
-              </a:ext>
-            </a:extLst>
-          </p:cNvPr>
-          <p:cNvPicPr>
-            <a:picLocks noChangeAspect="1"/>
-          </p:cNvPicPr>
-          <p:nvPr/>
-        </p:nvPicPr>
-        <p:blipFill>
-          <a:blip r:embed="rId4"/>
-          <a:stretch>
-            <a:fillRect/>
-          </a:stretch>
-        </p:blipFill>
-        <p:spPr>
-          <a:xfrm>
-            <a:off x="6652999" y="2184400"/>
-            <a:ext cx="3771900" cy="1244600"/>
-          </a:xfrm>
-          <a:prstGeom prst="rect">
-            <a:avLst/>
-          </a:prstGeom>
-        </p:spPr>
-      </p:pic>
-      <p:sp>
-        <p:nvSpPr>
-          <p:cNvPr id="11" name="TextBox 10">
-            <a:extLst>
-              <a:ext uri="{FF2B5EF4-FFF2-40B4-BE49-F238E27FC236}">
-                <a16:creationId xmlns:a16="http://schemas.microsoft.com/office/drawing/2014/main" id="{CCD56790-9D0A-C6F7-F3B0-0DDFAAF08100}"/>
-              </a:ext>
-            </a:extLst>
-          </p:cNvPr>
-          <p:cNvSpPr txBox="1"/>
-          <p:nvPr/>
-        </p:nvSpPr>
-        <p:spPr>
-          <a:xfrm>
-            <a:off x="6748535" y="1668739"/>
-            <a:ext cx="3883072" cy="646331"/>
-          </a:xfrm>
-          <a:prstGeom prst="rect">
-            <a:avLst/>
-          </a:prstGeom>
-          <a:noFill/>
-        </p:spPr>
-        <p:txBody>
-          <a:bodyPr wrap="square" rtlCol="0">
-            <a:spAutoFit/>
-          </a:bodyPr>
-          <a:lstStyle/>
-          <a:p>
-            <a:r>
-              <a:rPr lang="en-US" dirty="0"/>
-              <a:t>This is good. All federally established organizations are non-501c3s</a:t>
-            </a:r>
-          </a:p>
-        </p:txBody>
-      </p:sp>
-    </p:spTree>
-    <p:extLst>
-      <p:ext uri="{BB962C8B-B14F-4D97-AF65-F5344CB8AC3E}">
-        <p14:creationId xmlns:p14="http://schemas.microsoft.com/office/powerpoint/2010/main" val="1267954565"/>
-      </p:ext>
-    </p:extLst>
-  </p:cSld>
-  <p:clrMapOvr>
-    <a:masterClrMapping/>
-  </p:clrMapOvr>
-</p:sld>
-</file>
-
-<file path=ppt/slides/slide14.xml><?xml version="1.0" encoding="utf-8"?>
-<p:sld xmlns:a="http://schemas.openxmlformats.org/drawingml/2006/main" xmlns:r="http://schemas.openxmlformats.org/officeDocument/2006/relationships" xmlns:p="http://schemas.openxmlformats.org/presentationml/2006/main">
-  <p:cSld>
-    <p:spTree>
-      <p:nvGrpSpPr>
-        <p:cNvPr id="1" name=""/>
-        <p:cNvGrpSpPr/>
-        <p:nvPr/>
-      </p:nvGrpSpPr>
-      <p:grpSpPr>
-        <a:xfrm>
-          <a:off x="0" y="0"/>
-          <a:ext cx="0" cy="0"/>
-          <a:chOff x="0" y="0"/>
-          <a:chExt cx="0" cy="0"/>
-        </a:xfrm>
-      </p:grpSpPr>
-      <p:sp>
-        <p:nvSpPr>
-          <p:cNvPr id="2" name="Title 1">
-            <a:extLst>
-              <a:ext uri="{FF2B5EF4-FFF2-40B4-BE49-F238E27FC236}">
                 <a16:creationId xmlns:a16="http://schemas.microsoft.com/office/drawing/2014/main" id="{14210E66-B52C-36A7-3D14-6D4F0D2B71F7}"/>
               </a:ext>
             </a:extLst>
@@ -10760,7 +9918,7 @@
 </p:sld>
 </file>
 
-<file path=ppt/slides/slide15.xml><?xml version="1.0" encoding="utf-8"?>
+<file path=ppt/slides/slide14.xml><?xml version="1.0" encoding="utf-8"?>
 <p:sld xmlns:a="http://schemas.openxmlformats.org/drawingml/2006/main" xmlns:r="http://schemas.openxmlformats.org/officeDocument/2006/relationships" xmlns:p="http://schemas.openxmlformats.org/presentationml/2006/main">
   <p:cSld>
     <p:spTree>

</xml_diff>